<commit_message>
Promo Site Support Section
</commit_message>
<xml_diff>
--- a/Presentation Materials/Capstone Presentation.pptx
+++ b/Presentation Materials/Capstone Presentation.pptx
@@ -120,6 +120,22 @@
       </a:defRPr>
     </a:lvl9pPr>
   </p:defaultTextStyle>
+  <p:extLst>
+    <p:ext uri="{EFAFB233-063F-42B5-8137-9DF3F51BA10A}">
+      <p15:sldGuideLst xmlns:p15="http://schemas.microsoft.com/office/powerpoint/2012/main">
+        <p15:guide id="1" orient="horz" pos="2160">
+          <p15:clr>
+            <a:srgbClr val="A4A3A4"/>
+          </p15:clr>
+        </p15:guide>
+        <p15:guide id="2" pos="2880">
+          <p15:clr>
+            <a:srgbClr val="A4A3A4"/>
+          </p15:clr>
+        </p15:guide>
+      </p15:sldGuideLst>
+    </p:ext>
+  </p:extLst>
 </p:presentation>
 </file>
 
@@ -164,10 +180,9 @@
           <a:lstStyle/>
           <a:p>
             <a:r>
-              <a:rPr lang="en-US" smtClean="0"/>
+              <a:rPr lang="en-US"/>
               <a:t>Click to edit Master title style</a:t>
             </a:r>
-            <a:endParaRPr lang="en-US"/>
           </a:p>
         </p:txBody>
       </p:sp>
@@ -232,10 +247,9 @@
           </a:lstStyle>
           <a:p>
             <a:r>
-              <a:rPr lang="en-US" smtClean="0"/>
+              <a:rPr lang="en-US"/>
               <a:t>Click to edit Master subtitle style</a:t>
             </a:r>
-            <a:endParaRPr lang="en-US"/>
           </a:p>
         </p:txBody>
       </p:sp>
@@ -389,10 +403,9 @@
           <a:lstStyle/>
           <a:p>
             <a:r>
-              <a:rPr lang="en-US" smtClean="0"/>
+              <a:rPr lang="en-US"/>
               <a:t>Click to edit Master title style</a:t>
             </a:r>
-            <a:endParaRPr lang="en-US"/>
           </a:p>
         </p:txBody>
       </p:sp>
@@ -421,38 +434,37 @@
           <a:p>
             <a:pPr lvl="0"/>
             <a:r>
-              <a:rPr lang="en-US" smtClean="0"/>
+              <a:rPr lang="en-US"/>
               <a:t>Click to edit Master text styles</a:t>
             </a:r>
           </a:p>
           <a:p>
             <a:pPr lvl="1"/>
             <a:r>
-              <a:rPr lang="en-US" smtClean="0"/>
+              <a:rPr lang="en-US"/>
               <a:t>Second level</a:t>
             </a:r>
           </a:p>
           <a:p>
             <a:pPr lvl="2"/>
             <a:r>
-              <a:rPr lang="en-US" smtClean="0"/>
+              <a:rPr lang="en-US"/>
               <a:t>Third level</a:t>
             </a:r>
           </a:p>
           <a:p>
             <a:pPr lvl="3"/>
             <a:r>
-              <a:rPr lang="en-US" smtClean="0"/>
+              <a:rPr lang="en-US"/>
               <a:t>Fourth level</a:t>
             </a:r>
           </a:p>
           <a:p>
             <a:pPr lvl="4"/>
             <a:r>
-              <a:rPr lang="en-US" smtClean="0"/>
+              <a:rPr lang="en-US"/>
               <a:t>Fifth level</a:t>
             </a:r>
-            <a:endParaRPr lang="en-US"/>
           </a:p>
         </p:txBody>
       </p:sp>
@@ -606,10 +618,9 @@
           <a:lstStyle/>
           <a:p>
             <a:r>
-              <a:rPr lang="en-US" smtClean="0"/>
+              <a:rPr lang="en-US"/>
               <a:t>Click to edit Master title style</a:t>
             </a:r>
-            <a:endParaRPr lang="en-US"/>
           </a:p>
         </p:txBody>
       </p:sp>
@@ -638,38 +649,37 @@
           <a:p>
             <a:pPr lvl="0"/>
             <a:r>
-              <a:rPr lang="en-US" smtClean="0"/>
+              <a:rPr lang="en-US"/>
               <a:t>Click to edit Master text styles</a:t>
             </a:r>
           </a:p>
           <a:p>
             <a:pPr lvl="1"/>
             <a:r>
-              <a:rPr lang="en-US" smtClean="0"/>
+              <a:rPr lang="en-US"/>
               <a:t>Second level</a:t>
             </a:r>
           </a:p>
           <a:p>
             <a:pPr lvl="2"/>
             <a:r>
-              <a:rPr lang="en-US" smtClean="0"/>
+              <a:rPr lang="en-US"/>
               <a:t>Third level</a:t>
             </a:r>
           </a:p>
           <a:p>
             <a:pPr lvl="3"/>
             <a:r>
-              <a:rPr lang="en-US" smtClean="0"/>
+              <a:rPr lang="en-US"/>
               <a:t>Fourth level</a:t>
             </a:r>
           </a:p>
           <a:p>
             <a:pPr lvl="4"/>
             <a:r>
-              <a:rPr lang="en-US" smtClean="0"/>
+              <a:rPr lang="en-US"/>
               <a:t>Fifth level</a:t>
             </a:r>
-            <a:endParaRPr lang="en-US"/>
           </a:p>
         </p:txBody>
       </p:sp>
@@ -823,10 +833,9 @@
           <a:lstStyle/>
           <a:p>
             <a:r>
-              <a:rPr lang="en-US" smtClean="0"/>
+              <a:rPr lang="en-US"/>
               <a:t>Click to edit Master title style</a:t>
             </a:r>
-            <a:endParaRPr lang="en-US"/>
           </a:p>
         </p:txBody>
       </p:sp>
@@ -855,38 +864,37 @@
           <a:p>
             <a:pPr lvl="0"/>
             <a:r>
-              <a:rPr lang="en-US" smtClean="0"/>
+              <a:rPr lang="en-US"/>
               <a:t>Click to edit Master text styles</a:t>
             </a:r>
           </a:p>
           <a:p>
             <a:pPr lvl="1"/>
             <a:r>
-              <a:rPr lang="en-US" smtClean="0"/>
+              <a:rPr lang="en-US"/>
               <a:t>Second level</a:t>
             </a:r>
           </a:p>
           <a:p>
             <a:pPr lvl="2"/>
             <a:r>
-              <a:rPr lang="en-US" smtClean="0"/>
+              <a:rPr lang="en-US"/>
               <a:t>Third level</a:t>
             </a:r>
           </a:p>
           <a:p>
             <a:pPr lvl="3"/>
             <a:r>
-              <a:rPr lang="en-US" smtClean="0"/>
+              <a:rPr lang="en-US"/>
               <a:t>Fourth level</a:t>
             </a:r>
           </a:p>
           <a:p>
             <a:pPr lvl="4"/>
             <a:r>
-              <a:rPr lang="en-US" smtClean="0"/>
+              <a:rPr lang="en-US"/>
               <a:t>Fifth level</a:t>
             </a:r>
-            <a:endParaRPr lang="en-US"/>
           </a:p>
         </p:txBody>
       </p:sp>
@@ -1044,10 +1052,9 @@
           </a:lstStyle>
           <a:p>
             <a:r>
-              <a:rPr lang="en-US" smtClean="0"/>
+              <a:rPr lang="en-US"/>
               <a:t>Click to edit Master title style</a:t>
             </a:r>
-            <a:endParaRPr lang="en-US"/>
           </a:p>
         </p:txBody>
       </p:sp>
@@ -1113,7 +1120,7 @@
           <a:p>
             <a:pPr lvl="0"/>
             <a:r>
-              <a:rPr lang="en-US" smtClean="0"/>
+              <a:rPr lang="en-US"/>
               <a:t>Click to edit Master text styles</a:t>
             </a:r>
           </a:p>
@@ -1269,10 +1276,9 @@
           <a:lstStyle/>
           <a:p>
             <a:r>
-              <a:rPr lang="en-US" smtClean="0"/>
+              <a:rPr lang="en-US"/>
               <a:t>Click to edit Master title style</a:t>
             </a:r>
-            <a:endParaRPr lang="en-US"/>
           </a:p>
         </p:txBody>
       </p:sp>
@@ -1329,38 +1335,37 @@
           <a:p>
             <a:pPr lvl="0"/>
             <a:r>
-              <a:rPr lang="en-US" smtClean="0"/>
+              <a:rPr lang="en-US"/>
               <a:t>Click to edit Master text styles</a:t>
             </a:r>
           </a:p>
           <a:p>
             <a:pPr lvl="1"/>
             <a:r>
-              <a:rPr lang="en-US" smtClean="0"/>
+              <a:rPr lang="en-US"/>
               <a:t>Second level</a:t>
             </a:r>
           </a:p>
           <a:p>
             <a:pPr lvl="2"/>
             <a:r>
-              <a:rPr lang="en-US" smtClean="0"/>
+              <a:rPr lang="en-US"/>
               <a:t>Third level</a:t>
             </a:r>
           </a:p>
           <a:p>
             <a:pPr lvl="3"/>
             <a:r>
-              <a:rPr lang="en-US" smtClean="0"/>
+              <a:rPr lang="en-US"/>
               <a:t>Fourth level</a:t>
             </a:r>
           </a:p>
           <a:p>
             <a:pPr lvl="4"/>
             <a:r>
-              <a:rPr lang="en-US" smtClean="0"/>
+              <a:rPr lang="en-US"/>
               <a:t>Fifth level</a:t>
             </a:r>
-            <a:endParaRPr lang="en-US"/>
           </a:p>
         </p:txBody>
       </p:sp>
@@ -1417,38 +1422,37 @@
           <a:p>
             <a:pPr lvl="0"/>
             <a:r>
-              <a:rPr lang="en-US" smtClean="0"/>
+              <a:rPr lang="en-US"/>
               <a:t>Click to edit Master text styles</a:t>
             </a:r>
           </a:p>
           <a:p>
             <a:pPr lvl="1"/>
             <a:r>
-              <a:rPr lang="en-US" smtClean="0"/>
+              <a:rPr lang="en-US"/>
               <a:t>Second level</a:t>
             </a:r>
           </a:p>
           <a:p>
             <a:pPr lvl="2"/>
             <a:r>
-              <a:rPr lang="en-US" smtClean="0"/>
+              <a:rPr lang="en-US"/>
               <a:t>Third level</a:t>
             </a:r>
           </a:p>
           <a:p>
             <a:pPr lvl="3"/>
             <a:r>
-              <a:rPr lang="en-US" smtClean="0"/>
+              <a:rPr lang="en-US"/>
               <a:t>Fourth level</a:t>
             </a:r>
           </a:p>
           <a:p>
             <a:pPr lvl="4"/>
             <a:r>
-              <a:rPr lang="en-US" smtClean="0"/>
+              <a:rPr lang="en-US"/>
               <a:t>Fifth level</a:t>
             </a:r>
-            <a:endParaRPr lang="en-US"/>
           </a:p>
         </p:txBody>
       </p:sp>
@@ -1606,10 +1610,9 @@
           </a:lstStyle>
           <a:p>
             <a:r>
-              <a:rPr lang="en-US" smtClean="0"/>
+              <a:rPr lang="en-US"/>
               <a:t>Click to edit Master title style</a:t>
             </a:r>
-            <a:endParaRPr lang="en-US"/>
           </a:p>
         </p:txBody>
       </p:sp>
@@ -1675,7 +1678,7 @@
           <a:p>
             <a:pPr lvl="0"/>
             <a:r>
-              <a:rPr lang="en-US" smtClean="0"/>
+              <a:rPr lang="en-US"/>
               <a:t>Click to edit Master text styles</a:t>
             </a:r>
           </a:p>
@@ -1734,38 +1737,37 @@
           <a:p>
             <a:pPr lvl="0"/>
             <a:r>
-              <a:rPr lang="en-US" smtClean="0"/>
+              <a:rPr lang="en-US"/>
               <a:t>Click to edit Master text styles</a:t>
             </a:r>
           </a:p>
           <a:p>
             <a:pPr lvl="1"/>
             <a:r>
-              <a:rPr lang="en-US" smtClean="0"/>
+              <a:rPr lang="en-US"/>
               <a:t>Second level</a:t>
             </a:r>
           </a:p>
           <a:p>
             <a:pPr lvl="2"/>
             <a:r>
-              <a:rPr lang="en-US" smtClean="0"/>
+              <a:rPr lang="en-US"/>
               <a:t>Third level</a:t>
             </a:r>
           </a:p>
           <a:p>
             <a:pPr lvl="3"/>
             <a:r>
-              <a:rPr lang="en-US" smtClean="0"/>
+              <a:rPr lang="en-US"/>
               <a:t>Fourth level</a:t>
             </a:r>
           </a:p>
           <a:p>
             <a:pPr lvl="4"/>
             <a:r>
-              <a:rPr lang="en-US" smtClean="0"/>
+              <a:rPr lang="en-US"/>
               <a:t>Fifth level</a:t>
             </a:r>
-            <a:endParaRPr lang="en-US"/>
           </a:p>
         </p:txBody>
       </p:sp>
@@ -1831,7 +1833,7 @@
           <a:p>
             <a:pPr lvl="0"/>
             <a:r>
-              <a:rPr lang="en-US" smtClean="0"/>
+              <a:rPr lang="en-US"/>
               <a:t>Click to edit Master text styles</a:t>
             </a:r>
           </a:p>
@@ -1890,38 +1892,37 @@
           <a:p>
             <a:pPr lvl="0"/>
             <a:r>
-              <a:rPr lang="en-US" smtClean="0"/>
+              <a:rPr lang="en-US"/>
               <a:t>Click to edit Master text styles</a:t>
             </a:r>
           </a:p>
           <a:p>
             <a:pPr lvl="1"/>
             <a:r>
-              <a:rPr lang="en-US" smtClean="0"/>
+              <a:rPr lang="en-US"/>
               <a:t>Second level</a:t>
             </a:r>
           </a:p>
           <a:p>
             <a:pPr lvl="2"/>
             <a:r>
-              <a:rPr lang="en-US" smtClean="0"/>
+              <a:rPr lang="en-US"/>
               <a:t>Third level</a:t>
             </a:r>
           </a:p>
           <a:p>
             <a:pPr lvl="3"/>
             <a:r>
-              <a:rPr lang="en-US" smtClean="0"/>
+              <a:rPr lang="en-US"/>
               <a:t>Fourth level</a:t>
             </a:r>
           </a:p>
           <a:p>
             <a:pPr lvl="4"/>
             <a:r>
-              <a:rPr lang="en-US" smtClean="0"/>
+              <a:rPr lang="en-US"/>
               <a:t>Fifth level</a:t>
             </a:r>
-            <a:endParaRPr lang="en-US"/>
           </a:p>
         </p:txBody>
       </p:sp>
@@ -2075,10 +2076,9 @@
           <a:lstStyle/>
           <a:p>
             <a:r>
-              <a:rPr lang="en-US" smtClean="0"/>
+              <a:rPr lang="en-US"/>
               <a:t>Click to edit Master title style</a:t>
             </a:r>
-            <a:endParaRPr lang="en-US"/>
           </a:p>
         </p:txBody>
       </p:sp>
@@ -2362,10 +2362,9 @@
           </a:lstStyle>
           <a:p>
             <a:r>
-              <a:rPr lang="en-US" smtClean="0"/>
+              <a:rPr lang="en-US"/>
               <a:t>Click to edit Master title style</a:t>
             </a:r>
-            <a:endParaRPr lang="en-US"/>
           </a:p>
         </p:txBody>
       </p:sp>
@@ -2422,38 +2421,37 @@
           <a:p>
             <a:pPr lvl="0"/>
             <a:r>
-              <a:rPr lang="en-US" smtClean="0"/>
+              <a:rPr lang="en-US"/>
               <a:t>Click to edit Master text styles</a:t>
             </a:r>
           </a:p>
           <a:p>
             <a:pPr lvl="1"/>
             <a:r>
-              <a:rPr lang="en-US" smtClean="0"/>
+              <a:rPr lang="en-US"/>
               <a:t>Second level</a:t>
             </a:r>
           </a:p>
           <a:p>
             <a:pPr lvl="2"/>
             <a:r>
-              <a:rPr lang="en-US" smtClean="0"/>
+              <a:rPr lang="en-US"/>
               <a:t>Third level</a:t>
             </a:r>
           </a:p>
           <a:p>
             <a:pPr lvl="3"/>
             <a:r>
-              <a:rPr lang="en-US" smtClean="0"/>
+              <a:rPr lang="en-US"/>
               <a:t>Fourth level</a:t>
             </a:r>
           </a:p>
           <a:p>
             <a:pPr lvl="4"/>
             <a:r>
-              <a:rPr lang="en-US" smtClean="0"/>
+              <a:rPr lang="en-US"/>
               <a:t>Fifth level</a:t>
             </a:r>
-            <a:endParaRPr lang="en-US"/>
           </a:p>
         </p:txBody>
       </p:sp>
@@ -2519,7 +2517,7 @@
           <a:p>
             <a:pPr lvl="0"/>
             <a:r>
-              <a:rPr lang="en-US" smtClean="0"/>
+              <a:rPr lang="en-US"/>
               <a:t>Click to edit Master text styles</a:t>
             </a:r>
           </a:p>
@@ -2679,10 +2677,9 @@
           </a:lstStyle>
           <a:p>
             <a:r>
-              <a:rPr lang="en-US" smtClean="0"/>
+              <a:rPr lang="en-US"/>
               <a:t>Click to edit Master title style</a:t>
             </a:r>
-            <a:endParaRPr lang="en-US"/>
           </a:p>
         </p:txBody>
       </p:sp>
@@ -2747,7 +2744,7 @@
           </a:lstStyle>
           <a:p>
             <a:pPr lvl="0"/>
-            <a:endParaRPr lang="en-US" noProof="0" smtClean="0"/>
+            <a:endParaRPr lang="en-US" noProof="0"/>
           </a:p>
         </p:txBody>
       </p:sp>
@@ -2813,7 +2810,7 @@
           <a:p>
             <a:pPr lvl="0"/>
             <a:r>
-              <a:rPr lang="en-US" smtClean="0"/>
+              <a:rPr lang="en-US"/>
               <a:t>Click to edit Master text styles</a:t>
             </a:r>
           </a:p>
@@ -3421,13 +3418,6 @@
     <p:sldLayoutId id="2147483670" r:id="rId10"/>
     <p:sldLayoutId id="2147483671" r:id="rId11"/>
   </p:sldLayoutIdLst>
-  <p:timing>
-    <p:tnLst>
-      <p:par>
-        <p:cTn id="1" dur="indefinite" restart="never" nodeType="tmRoot"/>
-      </p:par>
-    </p:tnLst>
-  </p:timing>
   <p:txStyles>
     <p:titleStyle>
       <a:lvl1pPr algn="ctr" rtl="0" eaLnBrk="0" fontAlgn="base" hangingPunct="0">
@@ -3876,7 +3866,7 @@
           <a:p>
             <a:pPr algn="ctr"/>
             <a:r>
-              <a:rPr lang="en-US" sz="6000" b="1" cap="none" spc="50" dirty="0" smtClean="0">
+              <a:rPr lang="en-US" sz="6000" b="1" cap="none" spc="50" dirty="0">
                 <a:ln w="11430"/>
                 <a:gradFill>
                   <a:gsLst>
@@ -3904,32 +3894,6 @@
               </a:rPr>
               <a:t>Game Display Team</a:t>
             </a:r>
-            <a:endParaRPr lang="en-US" sz="6000" b="1" cap="none" spc="50" dirty="0">
-              <a:ln w="11430"/>
-              <a:gradFill>
-                <a:gsLst>
-                  <a:gs pos="25000">
-                    <a:schemeClr val="accent2">
-                      <a:satMod val="155000"/>
-                    </a:schemeClr>
-                  </a:gs>
-                  <a:gs pos="100000">
-                    <a:schemeClr val="accent2">
-                      <a:shade val="45000"/>
-                      <a:satMod val="165000"/>
-                    </a:schemeClr>
-                  </a:gs>
-                </a:gsLst>
-                <a:lin ang="5400000"/>
-              </a:gradFill>
-              <a:effectLst>
-                <a:outerShdw blurRad="76200" dist="50800" dir="5400000" algn="tl" rotWithShape="0">
-                  <a:srgbClr val="000000">
-                    <a:alpha val="65000"/>
-                  </a:srgbClr>
-                </a:outerShdw>
-              </a:effectLst>
-            </a:endParaRPr>
           </a:p>
         </p:txBody>
       </p:sp>
@@ -3941,8 +3905,8 @@
         </p:nvSpPr>
         <p:spPr>
           <a:xfrm>
-            <a:off x="3581181" y="2286000"/>
-            <a:ext cx="1981633" cy="3170099"/>
+            <a:off x="2640220" y="2286000"/>
+            <a:ext cx="3863558" cy="3170099"/>
           </a:xfrm>
           <a:prstGeom prst="rect">
             <a:avLst/>
@@ -3957,7 +3921,7 @@
           <a:p>
             <a:pPr algn="ctr"/>
             <a:r>
-              <a:rPr lang="en-US" sz="4000" b="1" cap="none" spc="0" dirty="0" smtClean="0">
+              <a:rPr lang="en-US" sz="4000" b="1" cap="none" spc="0" dirty="0">
                 <a:ln w="24500" cmpd="dbl">
                   <a:solidFill>
                     <a:schemeClr val="accent2">
@@ -3999,13 +3963,100 @@
                   </a:outerShdw>
                 </a:effectLst>
               </a:rPr>
-              <a:t>Josiah</a:t>
+              <a:t>Josiah </a:t>
             </a:r>
+            <a:r>
+              <a:rPr lang="en-US" sz="4000" b="1" cap="none" spc="0" dirty="0" err="1">
+                <a:ln w="24500" cmpd="dbl">
+                  <a:solidFill>
+                    <a:schemeClr val="accent2">
+                      <a:shade val="85000"/>
+                      <a:satMod val="155000"/>
+                    </a:schemeClr>
+                  </a:solidFill>
+                  <a:prstDash val="solid"/>
+                  <a:miter lim="800000"/>
+                </a:ln>
+                <a:gradFill>
+                  <a:gsLst>
+                    <a:gs pos="10000">
+                      <a:schemeClr val="accent2">
+                        <a:tint val="10000"/>
+                        <a:satMod val="155000"/>
+                      </a:schemeClr>
+                    </a:gs>
+                    <a:gs pos="60000">
+                      <a:schemeClr val="accent2">
+                        <a:tint val="30000"/>
+                        <a:satMod val="155000"/>
+                      </a:schemeClr>
+                    </a:gs>
+                    <a:gs pos="100000">
+                      <a:schemeClr val="accent2">
+                        <a:tint val="73000"/>
+                        <a:satMod val="155000"/>
+                      </a:schemeClr>
+                    </a:gs>
+                  </a:gsLst>
+                  <a:lin ang="5400000"/>
+                </a:gradFill>
+                <a:effectLst>
+                  <a:outerShdw blurRad="38100" dist="38100" dir="7020000" algn="tl">
+                    <a:srgbClr val="000000">
+                      <a:alpha val="35000"/>
+                    </a:srgbClr>
+                  </a:outerShdw>
+                </a:effectLst>
+              </a:rPr>
+              <a:t>Hertzler</a:t>
+            </a:r>
+            <a:endParaRPr lang="en-US" sz="4000" b="1" cap="none" spc="0" dirty="0">
+              <a:ln w="24500" cmpd="dbl">
+                <a:solidFill>
+                  <a:schemeClr val="accent2">
+                    <a:shade val="85000"/>
+                    <a:satMod val="155000"/>
+                  </a:schemeClr>
+                </a:solidFill>
+                <a:prstDash val="solid"/>
+                <a:miter lim="800000"/>
+              </a:ln>
+              <a:gradFill>
+                <a:gsLst>
+                  <a:gs pos="10000">
+                    <a:schemeClr val="accent2">
+                      <a:tint val="10000"/>
+                      <a:satMod val="155000"/>
+                    </a:schemeClr>
+                  </a:gs>
+                  <a:gs pos="60000">
+                    <a:schemeClr val="accent2">
+                      <a:tint val="30000"/>
+                      <a:satMod val="155000"/>
+                    </a:schemeClr>
+                  </a:gs>
+                  <a:gs pos="100000">
+                    <a:schemeClr val="accent2">
+                      <a:tint val="73000"/>
+                      <a:satMod val="155000"/>
+                    </a:schemeClr>
+                  </a:gs>
+                </a:gsLst>
+                <a:lin ang="5400000"/>
+              </a:gradFill>
+              <a:effectLst>
+                <a:outerShdw blurRad="38100" dist="38100" dir="7020000" algn="tl">
+                  <a:srgbClr val="000000">
+                    <a:alpha val="35000"/>
+                  </a:srgbClr>
+                </a:outerShdw>
+              </a:effectLst>
+            </a:endParaRPr>
           </a:p>
           <a:p>
             <a:pPr algn="ctr"/>
             <a:r>
-              <a:rPr lang="en-US" sz="4000" b="1" dirty="0" err="1" smtClean="0">
+              <a:rPr lang="en-US" sz="4000" b="1" dirty="0" err="1">
                 <a:ln w="24500" cmpd="dbl">
                   <a:solidFill>
                     <a:schemeClr val="accent2">
@@ -4050,7 +4101,7 @@
               <a:t>Taha</a:t>
             </a:r>
             <a:r>
-              <a:rPr lang="en-US" sz="4000" b="1" dirty="0" smtClean="0">
+              <a:rPr lang="en-US" sz="4000" b="1" dirty="0">
                 <a:ln w="24500" cmpd="dbl">
                   <a:solidFill>
                     <a:schemeClr val="accent2">
@@ -4092,13 +4143,13 @@
                   </a:outerShdw>
                 </a:effectLst>
               </a:rPr>
-              <a:t> </a:t>
+              <a:t> Siddique</a:t>
             </a:r>
           </a:p>
           <a:p>
             <a:pPr algn="ctr"/>
             <a:r>
-              <a:rPr lang="en-US" sz="4000" b="1" cap="none" spc="0" dirty="0" smtClean="0">
+              <a:rPr lang="en-US" sz="4000" b="1" cap="none" spc="0" dirty="0">
                 <a:ln w="24500" cmpd="dbl">
                   <a:solidFill>
                     <a:schemeClr val="accent2">
@@ -4140,13 +4191,10 @@
                   </a:outerShdw>
                 </a:effectLst>
               </a:rPr>
-              <a:t>Jack</a:t>
+              <a:t>Jack </a:t>
             </a:r>
-          </a:p>
-          <a:p>
-            <a:pPr algn="ctr"/>
             <a:r>
-              <a:rPr lang="en-US" sz="4000" b="1" dirty="0" smtClean="0">
+              <a:rPr lang="en-US" sz="4000" b="1" cap="none" spc="0" dirty="0" err="1">
                 <a:ln w="24500" cmpd="dbl">
                   <a:solidFill>
                     <a:schemeClr val="accent2">
@@ -4188,13 +4236,55 @@
                   </a:outerShdw>
                 </a:effectLst>
               </a:rPr>
-              <a:t>Tom</a:t>
+              <a:t>McFann</a:t>
             </a:r>
+            <a:endParaRPr lang="en-US" sz="4000" b="1" cap="none" spc="0" dirty="0">
+              <a:ln w="24500" cmpd="dbl">
+                <a:solidFill>
+                  <a:schemeClr val="accent2">
+                    <a:shade val="85000"/>
+                    <a:satMod val="155000"/>
+                  </a:schemeClr>
+                </a:solidFill>
+                <a:prstDash val="solid"/>
+                <a:miter lim="800000"/>
+              </a:ln>
+              <a:gradFill>
+                <a:gsLst>
+                  <a:gs pos="10000">
+                    <a:schemeClr val="accent2">
+                      <a:tint val="10000"/>
+                      <a:satMod val="155000"/>
+                    </a:schemeClr>
+                  </a:gs>
+                  <a:gs pos="60000">
+                    <a:schemeClr val="accent2">
+                      <a:tint val="30000"/>
+                      <a:satMod val="155000"/>
+                    </a:schemeClr>
+                  </a:gs>
+                  <a:gs pos="100000">
+                    <a:schemeClr val="accent2">
+                      <a:tint val="73000"/>
+                      <a:satMod val="155000"/>
+                    </a:schemeClr>
+                  </a:gs>
+                </a:gsLst>
+                <a:lin ang="5400000"/>
+              </a:gradFill>
+              <a:effectLst>
+                <a:outerShdw blurRad="38100" dist="38100" dir="7020000" algn="tl">
+                  <a:srgbClr val="000000">
+                    <a:alpha val="35000"/>
+                  </a:srgbClr>
+                </a:outerShdw>
+              </a:effectLst>
+            </a:endParaRPr>
           </a:p>
           <a:p>
             <a:pPr algn="ctr"/>
             <a:r>
-              <a:rPr lang="en-US" sz="4000" b="1" cap="none" spc="0" dirty="0" smtClean="0">
+              <a:rPr lang="en-US" sz="4000" b="1" dirty="0">
                 <a:ln w="24500" cmpd="dbl">
                   <a:solidFill>
                     <a:schemeClr val="accent2">
@@ -4236,50 +4326,56 @@
                   </a:outerShdw>
                 </a:effectLst>
               </a:rPr>
-              <a:t>Sawyer</a:t>
+              <a:t>Tom Hoffman</a:t>
             </a:r>
-            <a:endParaRPr lang="en-US" sz="4000" b="1" cap="none" spc="0" dirty="0">
-              <a:ln w="24500" cmpd="dbl">
-                <a:solidFill>
-                  <a:schemeClr val="accent2">
-                    <a:shade val="85000"/>
-                    <a:satMod val="155000"/>
-                  </a:schemeClr>
-                </a:solidFill>
-                <a:prstDash val="solid"/>
-                <a:miter lim="800000"/>
-              </a:ln>
-              <a:gradFill>
-                <a:gsLst>
-                  <a:gs pos="10000">
+          </a:p>
+          <a:p>
+            <a:pPr algn="ctr"/>
+            <a:r>
+              <a:rPr lang="en-US" sz="4000" b="1" cap="none" spc="0" dirty="0">
+                <a:ln w="24500" cmpd="dbl">
+                  <a:solidFill>
                     <a:schemeClr val="accent2">
-                      <a:tint val="10000"/>
+                      <a:shade val="85000"/>
                       <a:satMod val="155000"/>
                     </a:schemeClr>
-                  </a:gs>
-                  <a:gs pos="60000">
-                    <a:schemeClr val="accent2">
-                      <a:tint val="30000"/>
-                      <a:satMod val="155000"/>
-                    </a:schemeClr>
-                  </a:gs>
-                  <a:gs pos="100000">
-                    <a:schemeClr val="accent2">
-                      <a:tint val="73000"/>
-                      <a:satMod val="155000"/>
-                    </a:schemeClr>
-                  </a:gs>
-                </a:gsLst>
-                <a:lin ang="5400000"/>
-              </a:gradFill>
-              <a:effectLst>
-                <a:outerShdw blurRad="38100" dist="38100" dir="7020000" algn="tl">
-                  <a:srgbClr val="000000">
-                    <a:alpha val="35000"/>
-                  </a:srgbClr>
-                </a:outerShdw>
-              </a:effectLst>
-            </a:endParaRPr>
+                  </a:solidFill>
+                  <a:prstDash val="solid"/>
+                  <a:miter lim="800000"/>
+                </a:ln>
+                <a:gradFill>
+                  <a:gsLst>
+                    <a:gs pos="10000">
+                      <a:schemeClr val="accent2">
+                        <a:tint val="10000"/>
+                        <a:satMod val="155000"/>
+                      </a:schemeClr>
+                    </a:gs>
+                    <a:gs pos="60000">
+                      <a:schemeClr val="accent2">
+                        <a:tint val="30000"/>
+                        <a:satMod val="155000"/>
+                      </a:schemeClr>
+                    </a:gs>
+                    <a:gs pos="100000">
+                      <a:schemeClr val="accent2">
+                        <a:tint val="73000"/>
+                        <a:satMod val="155000"/>
+                      </a:schemeClr>
+                    </a:gs>
+                  </a:gsLst>
+                  <a:lin ang="5400000"/>
+                </a:gradFill>
+                <a:effectLst>
+                  <a:outerShdw blurRad="38100" dist="38100" dir="7020000" algn="tl">
+                    <a:srgbClr val="000000">
+                      <a:alpha val="35000"/>
+                    </a:srgbClr>
+                  </a:outerShdw>
+                </a:effectLst>
+              </a:rPr>
+              <a:t>Sawyer Brown</a:t>
+            </a:r>
           </a:p>
         </p:txBody>
       </p:sp>
@@ -4293,13 +4389,6 @@
   <p:clrMapOvr>
     <a:masterClrMapping/>
   </p:clrMapOvr>
-  <p:timing>
-    <p:tnLst>
-      <p:par>
-        <p:cTn id="1" dur="indefinite" restart="never" nodeType="tmRoot"/>
-      </p:par>
-    </p:tnLst>
-  </p:timing>
 </p:sld>
 </file>
 
@@ -4643,13 +4732,6 @@
   <p:clrMapOvr>
     <a:masterClrMapping/>
   </p:clrMapOvr>
-  <p:timing>
-    <p:tnLst>
-      <p:par>
-        <p:cTn id="1" dur="indefinite" restart="never" nodeType="tmRoot"/>
-      </p:par>
-    </p:tnLst>
-  </p:timing>
 </p:sld>
 </file>
 
@@ -4694,7 +4776,7 @@
           <a:p>
             <a:pPr algn="ctr"/>
             <a:r>
-              <a:rPr lang="en-US" sz="5400" b="1" dirty="0" smtClean="0">
+              <a:rPr lang="en-US" sz="5400" b="1" dirty="0">
                 <a:ln w="1905"/>
                 <a:gradFill>
                   <a:gsLst>
@@ -4730,40 +4812,6 @@
               </a:rPr>
               <a:t>Testing Arena</a:t>
             </a:r>
-            <a:endParaRPr lang="en-US" sz="5400" b="1" dirty="0">
-              <a:ln w="1905"/>
-              <a:gradFill>
-                <a:gsLst>
-                  <a:gs pos="0">
-                    <a:schemeClr val="accent6">
-                      <a:shade val="20000"/>
-                      <a:satMod val="200000"/>
-                    </a:schemeClr>
-                  </a:gs>
-                  <a:gs pos="78000">
-                    <a:schemeClr val="accent6">
-                      <a:tint val="90000"/>
-                      <a:shade val="89000"/>
-                      <a:satMod val="220000"/>
-                    </a:schemeClr>
-                  </a:gs>
-                  <a:gs pos="100000">
-                    <a:schemeClr val="accent6">
-                      <a:tint val="12000"/>
-                      <a:satMod val="255000"/>
-                    </a:schemeClr>
-                  </a:gs>
-                </a:gsLst>
-                <a:lin ang="5400000"/>
-              </a:gradFill>
-              <a:effectLst>
-                <a:innerShdw blurRad="69850" dist="43180" dir="5400000">
-                  <a:srgbClr val="000000">
-                    <a:alpha val="65000"/>
-                  </a:srgbClr>
-                </a:innerShdw>
-              </a:effectLst>
-            </a:endParaRPr>
           </a:p>
         </p:txBody>
       </p:sp>
@@ -4794,10 +4842,9 @@
               <a:buChar char="•"/>
             </a:pPr>
             <a:r>
-              <a:rPr lang="en-US" sz="3600" b="1" dirty="0" smtClean="0"/>
+              <a:rPr lang="en-US" sz="3600" b="1" dirty="0"/>
               <a:t>Debugging Mode</a:t>
             </a:r>
-            <a:endParaRPr lang="en-US" sz="3600" b="1" dirty="0"/>
           </a:p>
           <a:p>
             <a:pPr marL="457200" indent="-457200">
@@ -4805,7 +4852,7 @@
               <a:buChar char="•"/>
             </a:pPr>
             <a:r>
-              <a:rPr lang="en-US" sz="3600" b="1" dirty="0" smtClean="0"/>
+              <a:rPr lang="en-US" sz="3600" b="1" dirty="0"/>
               <a:t>Update bot each turn</a:t>
             </a:r>
           </a:p>
@@ -4815,7 +4862,7 @@
               <a:buChar char="•"/>
             </a:pPr>
             <a:r>
-              <a:rPr lang="en-US" sz="3600" b="1" dirty="0" smtClean="0"/>
+              <a:rPr lang="en-US" sz="3600" b="1" dirty="0"/>
               <a:t>Upload File</a:t>
             </a:r>
           </a:p>
@@ -4825,7 +4872,7 @@
               <a:buChar char="•"/>
             </a:pPr>
             <a:r>
-              <a:rPr lang="en-US" sz="3600" b="1" dirty="0" smtClean="0"/>
+              <a:rPr lang="en-US" sz="3600" b="1" dirty="0"/>
               <a:t>Edit Code</a:t>
             </a:r>
           </a:p>
@@ -4835,7 +4882,7 @@
               <a:buChar char="•"/>
             </a:pPr>
             <a:r>
-              <a:rPr lang="en-US" sz="3600" b="1" dirty="0" smtClean="0"/>
+              <a:rPr lang="en-US" sz="3600" b="1" dirty="0"/>
               <a:t>Test against other bots</a:t>
             </a:r>
           </a:p>
@@ -4845,7 +4892,7 @@
               <a:buChar char="•"/>
             </a:pPr>
             <a:r>
-              <a:rPr lang="en-US" sz="3600" b="1" dirty="0" smtClean="0"/>
+              <a:rPr lang="en-US" sz="3600" b="1" dirty="0"/>
               <a:t>Public Bot</a:t>
             </a:r>
           </a:p>
@@ -4855,7 +4902,7 @@
               <a:buChar char="•"/>
             </a:pPr>
             <a:r>
-              <a:rPr lang="en-US" sz="3600" b="1" dirty="0" smtClean="0"/>
+              <a:rPr lang="en-US" sz="3600" b="1" dirty="0"/>
               <a:t>Default Bot</a:t>
             </a:r>
           </a:p>
@@ -4864,7 +4911,7 @@
               <a:buFont typeface="Arial" panose="020B0604020202020204" pitchFamily="34" charset="0"/>
               <a:buChar char="•"/>
             </a:pPr>
-            <a:endParaRPr lang="en-US" sz="3600" b="1" dirty="0" smtClean="0"/>
+            <a:endParaRPr lang="en-US" sz="3600" b="1" dirty="0"/>
           </a:p>
         </p:txBody>
       </p:sp>
@@ -4878,13 +4925,6 @@
   <p:clrMapOvr>
     <a:masterClrMapping/>
   </p:clrMapOvr>
-  <p:timing>
-    <p:tnLst>
-      <p:par>
-        <p:cTn id="1" dur="indefinite" restart="never" nodeType="tmRoot"/>
-      </p:par>
-    </p:tnLst>
-  </p:timing>
 </p:sld>
 </file>
 
@@ -4997,13 +5037,6 @@
   <p:clrMapOvr>
     <a:masterClrMapping/>
   </p:clrMapOvr>
-  <p:timing>
-    <p:tnLst>
-      <p:par>
-        <p:cTn id="1" dur="indefinite" restart="never" nodeType="tmRoot"/>
-      </p:par>
-    </p:tnLst>
-  </p:timing>
 </p:sld>
 </file>
 
@@ -5170,13 +5203,6 @@
   <p:clrMapOvr>
     <a:masterClrMapping/>
   </p:clrMapOvr>
-  <p:timing>
-    <p:tnLst>
-      <p:par>
-        <p:cTn id="1" dur="indefinite" restart="never" nodeType="tmRoot"/>
-      </p:par>
-    </p:tnLst>
-  </p:timing>
 </p:sld>
 </file>
 
@@ -5622,7 +5648,7 @@
               <a:tabLst/>
             </a:pPr>
             <a:r>
-              <a:rPr lang="en-US" sz="1600" dirty="0" smtClean="0">
+              <a:rPr lang="en-US" sz="1600" dirty="0">
                 <a:solidFill>
                   <a:srgbClr val="92D050"/>
                 </a:solidFill>
@@ -5650,7 +5676,7 @@
               <a:buNone/>
               <a:tabLst/>
             </a:pPr>
-            <a:endParaRPr lang="en-US" sz="1600" dirty="0" smtClean="0">
+            <a:endParaRPr lang="en-US" sz="1600" dirty="0">
               <a:solidFill>
                 <a:srgbClr val="92D050"/>
               </a:solidFill>
@@ -5688,24 +5714,10 @@
                 <a:ea typeface="ＭＳ Ｐゴシック" pitchFamily="-112" charset="-128"/>
                 <a:cs typeface="ＭＳ Ｐゴシック" pitchFamily="-112" charset="-128"/>
               </a:rPr>
-              <a:t>p</a:t>
+              <a:t>public static void main(String </a:t>
             </a:r>
             <a:r>
-              <a:rPr lang="en-US" sz="1600" dirty="0" smtClean="0">
-                <a:solidFill>
-                  <a:schemeClr val="bg2">
-                    <a:lumMod val="20000"/>
-                    <a:lumOff val="80000"/>
-                  </a:schemeClr>
-                </a:solidFill>
-                <a:latin typeface="Arial" pitchFamily="-112" charset="0"/>
-                <a:ea typeface="ＭＳ Ｐゴシック" pitchFamily="-112" charset="-128"/>
-                <a:cs typeface="ＭＳ Ｐゴシック" pitchFamily="-112" charset="-128"/>
-              </a:rPr>
-              <a:t>ublic static void main(String </a:t>
-            </a:r>
-            <a:r>
-              <a:rPr lang="en-US" sz="1600" dirty="0" err="1" smtClean="0">
+              <a:rPr lang="en-US" sz="1600" dirty="0" err="1">
                 <a:solidFill>
                   <a:schemeClr val="bg2">
                     <a:lumMod val="20000"/>
@@ -5719,7 +5731,7 @@
               <a:t>args</a:t>
             </a:r>
             <a:r>
-              <a:rPr lang="en-US" sz="1600" dirty="0" smtClean="0">
+              <a:rPr lang="en-US" sz="1600" dirty="0">
                 <a:solidFill>
                   <a:schemeClr val="bg2">
                     <a:lumMod val="20000"/>
@@ -5762,24 +5774,10 @@
                 <a:ea typeface="ＭＳ Ｐゴシック" pitchFamily="-112" charset="-128"/>
                 <a:cs typeface="ＭＳ Ｐゴシック" pitchFamily="-112" charset="-128"/>
               </a:rPr>
-              <a:t> </a:t>
+              <a:t>    </a:t>
             </a:r>
             <a:r>
-              <a:rPr lang="en-US" sz="1600" dirty="0" smtClean="0">
-                <a:solidFill>
-                  <a:schemeClr val="bg2">
-                    <a:lumMod val="20000"/>
-                    <a:lumOff val="80000"/>
-                  </a:schemeClr>
-                </a:solidFill>
-                <a:latin typeface="Arial" pitchFamily="-112" charset="0"/>
-                <a:ea typeface="ＭＳ Ｐゴシック" pitchFamily="-112" charset="-128"/>
-                <a:cs typeface="ＭＳ Ｐゴシック" pitchFamily="-112" charset="-128"/>
-              </a:rPr>
-              <a:t>   </a:t>
-            </a:r>
-            <a:r>
-              <a:rPr lang="en-US" sz="1600" dirty="0" err="1" smtClean="0">
+              <a:rPr lang="en-US" sz="1600" dirty="0" err="1">
                 <a:solidFill>
                   <a:schemeClr val="bg2">
                     <a:lumMod val="20000"/>
@@ -5793,7 +5791,7 @@
               <a:t>System.out.print</a:t>
             </a:r>
             <a:r>
-              <a:rPr lang="en-US" sz="1600" dirty="0" smtClean="0">
+              <a:rPr lang="en-US" sz="1600" dirty="0">
                 <a:solidFill>
                   <a:schemeClr val="bg2">
                     <a:lumMod val="20000"/>
@@ -5806,17 +5804,6 @@
               </a:rPr>
               <a:t>(“Hello!”);</a:t>
             </a:r>
-            <a:endParaRPr lang="en-US" sz="1600" dirty="0">
-              <a:solidFill>
-                <a:schemeClr val="bg2">
-                  <a:lumMod val="20000"/>
-                  <a:lumOff val="80000"/>
-                </a:schemeClr>
-              </a:solidFill>
-              <a:latin typeface="Arial" pitchFamily="-112" charset="0"/>
-              <a:ea typeface="ＭＳ Ｐゴシック" pitchFamily="-112" charset="-128"/>
-              <a:cs typeface="ＭＳ Ｐゴシック" pitchFamily="-112" charset="-128"/>
-            </a:endParaRPr>
           </a:p>
           <a:p>
             <a:pPr marL="0" marR="0" indent="0" algn="l" defTabSz="914400" rtl="0" eaLnBrk="0" fontAlgn="base" latinLnBrk="0" hangingPunct="0">
@@ -5836,7 +5823,7 @@
               <a:tabLst/>
             </a:pPr>
             <a:r>
-              <a:rPr lang="en-US" sz="1600" dirty="0" smtClean="0">
+              <a:rPr lang="en-US" sz="1600" dirty="0">
                 <a:solidFill>
                   <a:schemeClr val="bg2">
                     <a:lumMod val="20000"/>
@@ -5862,13 +5849,6 @@
   <p:clrMapOvr>
     <a:masterClrMapping/>
   </p:clrMapOvr>
-  <p:timing>
-    <p:tnLst>
-      <p:par>
-        <p:cTn id="1" dur="indefinite" restart="never" nodeType="tmRoot"/>
-      </p:par>
-    </p:tnLst>
-  </p:timing>
 </p:sld>
 </file>
 
@@ -6264,13 +6244,6 @@
   <p:clrMapOvr>
     <a:masterClrMapping/>
   </p:clrMapOvr>
-  <p:timing>
-    <p:tnLst>
-      <p:par>
-        <p:cTn id="1" dur="indefinite" restart="never" nodeType="tmRoot"/>
-      </p:par>
-    </p:tnLst>
-  </p:timing>
 </p:sld>
 </file>
 
@@ -6666,13 +6639,6 @@
   <p:clrMapOvr>
     <a:masterClrMapping/>
   </p:clrMapOvr>
-  <p:timing>
-    <p:tnLst>
-      <p:par>
-        <p:cTn id="1" dur="indefinite" restart="never" nodeType="tmRoot"/>
-      </p:par>
-    </p:tnLst>
-  </p:timing>
 </p:sld>
 </file>
 
@@ -6717,7 +6683,7 @@
           <a:p>
             <a:pPr algn="ctr"/>
             <a:r>
-              <a:rPr lang="en-US" sz="5400" b="1" dirty="0" smtClean="0">
+              <a:rPr lang="en-US" sz="5400" b="1" dirty="0">
                 <a:ln w="1905"/>
                 <a:gradFill>
                   <a:gsLst>
@@ -6753,40 +6719,6 @@
               </a:rPr>
               <a:t>Capture The Flag</a:t>
             </a:r>
-            <a:endParaRPr lang="en-US" sz="5400" b="1" dirty="0">
-              <a:ln w="1905"/>
-              <a:gradFill>
-                <a:gsLst>
-                  <a:gs pos="0">
-                    <a:schemeClr val="accent6">
-                      <a:shade val="20000"/>
-                      <a:satMod val="200000"/>
-                    </a:schemeClr>
-                  </a:gs>
-                  <a:gs pos="78000">
-                    <a:schemeClr val="accent6">
-                      <a:tint val="90000"/>
-                      <a:shade val="89000"/>
-                      <a:satMod val="220000"/>
-                    </a:schemeClr>
-                  </a:gs>
-                  <a:gs pos="100000">
-                    <a:schemeClr val="accent6">
-                      <a:tint val="12000"/>
-                      <a:satMod val="255000"/>
-                    </a:schemeClr>
-                  </a:gs>
-                </a:gsLst>
-                <a:lin ang="5400000"/>
-              </a:gradFill>
-              <a:effectLst>
-                <a:innerShdw blurRad="69850" dist="43180" dir="5400000">
-                  <a:srgbClr val="000000">
-                    <a:alpha val="65000"/>
-                  </a:srgbClr>
-                </a:innerShdw>
-              </a:effectLst>
-            </a:endParaRPr>
           </a:p>
         </p:txBody>
       </p:sp>
@@ -6817,10 +6749,9 @@
               <a:buChar char="•"/>
             </a:pPr>
             <a:r>
-              <a:rPr lang="en-US" sz="3600" b="1" dirty="0" smtClean="0"/>
+              <a:rPr lang="en-US" sz="3600" b="1" dirty="0"/>
               <a:t>Math Based Game Challenge</a:t>
             </a:r>
-            <a:endParaRPr lang="en-US" sz="3600" b="1" dirty="0"/>
           </a:p>
           <a:p>
             <a:pPr marL="457200" indent="-457200">
@@ -6828,7 +6759,7 @@
               <a:buChar char="•"/>
             </a:pPr>
             <a:r>
-              <a:rPr lang="en-US" sz="3600" b="1" dirty="0" smtClean="0"/>
+              <a:rPr lang="en-US" sz="3600" b="1" dirty="0"/>
               <a:t>Balance Attack and Defense</a:t>
             </a:r>
           </a:p>
@@ -6838,7 +6769,7 @@
               <a:buChar char="•"/>
             </a:pPr>
             <a:r>
-              <a:rPr lang="en-US" sz="3600" b="1" dirty="0" smtClean="0"/>
+              <a:rPr lang="en-US" sz="3600" b="1" dirty="0"/>
               <a:t>Many layers of strategy</a:t>
             </a:r>
           </a:p>
@@ -6848,7 +6779,7 @@
               <a:buChar char="•"/>
             </a:pPr>
             <a:r>
-              <a:rPr lang="en-US" sz="3600" b="1" dirty="0" smtClean="0"/>
+              <a:rPr lang="en-US" sz="3600" b="1" dirty="0"/>
               <a:t>Aggressive vs Conservative</a:t>
             </a:r>
           </a:p>
@@ -6858,7 +6789,7 @@
               <a:buChar char="•"/>
             </a:pPr>
             <a:r>
-              <a:rPr lang="en-US" sz="3600" b="1" dirty="0" smtClean="0"/>
+              <a:rPr lang="en-US" sz="3600" b="1" dirty="0"/>
               <a:t>Attack Focus vs Defense</a:t>
             </a:r>
           </a:p>
@@ -6867,7 +6798,7 @@
               <a:buFont typeface="Arial" panose="020B0604020202020204" pitchFamily="34" charset="0"/>
               <a:buChar char="•"/>
             </a:pPr>
-            <a:endParaRPr lang="en-US" sz="3600" b="1" dirty="0" smtClean="0"/>
+            <a:endParaRPr lang="en-US" sz="3600" b="1" dirty="0"/>
           </a:p>
         </p:txBody>
       </p:sp>
@@ -6881,13 +6812,6 @@
   <p:clrMapOvr>
     <a:masterClrMapping/>
   </p:clrMapOvr>
-  <p:timing>
-    <p:tnLst>
-      <p:par>
-        <p:cTn id="1" dur="indefinite" restart="never" nodeType="tmRoot"/>
-      </p:par>
-    </p:tnLst>
-  </p:timing>
 </p:sld>
 </file>
 
@@ -6932,7 +6856,7 @@
           <a:p>
             <a:pPr algn="ctr"/>
             <a:r>
-              <a:rPr lang="en-US" sz="5400" b="1" dirty="0" err="1" smtClean="0">
+              <a:rPr lang="en-US" sz="5400" b="1" dirty="0" err="1">
                 <a:ln w="1905"/>
                 <a:gradFill>
                   <a:gsLst>
@@ -6969,7 +6893,7 @@
               <a:t>Bot!Battle</a:t>
             </a:r>
             <a:r>
-              <a:rPr lang="en-US" sz="5400" b="1" dirty="0" smtClean="0">
+              <a:rPr lang="en-US" sz="5400" b="1" dirty="0">
                 <a:ln w="1905"/>
                 <a:gradFill>
                   <a:gsLst>
@@ -7005,40 +6929,6 @@
               </a:rPr>
               <a:t>! System</a:t>
             </a:r>
-            <a:endParaRPr lang="en-US" sz="5400" b="1" dirty="0">
-              <a:ln w="1905"/>
-              <a:gradFill>
-                <a:gsLst>
-                  <a:gs pos="0">
-                    <a:schemeClr val="accent6">
-                      <a:shade val="20000"/>
-                      <a:satMod val="200000"/>
-                    </a:schemeClr>
-                  </a:gs>
-                  <a:gs pos="78000">
-                    <a:schemeClr val="accent6">
-                      <a:tint val="90000"/>
-                      <a:shade val="89000"/>
-                      <a:satMod val="220000"/>
-                    </a:schemeClr>
-                  </a:gs>
-                  <a:gs pos="100000">
-                    <a:schemeClr val="accent6">
-                      <a:tint val="12000"/>
-                      <a:satMod val="255000"/>
-                    </a:schemeClr>
-                  </a:gs>
-                </a:gsLst>
-                <a:lin ang="5400000"/>
-              </a:gradFill>
-              <a:effectLst>
-                <a:innerShdw blurRad="69850" dist="43180" dir="5400000">
-                  <a:srgbClr val="000000">
-                    <a:alpha val="65000"/>
-                  </a:srgbClr>
-                </a:innerShdw>
-              </a:effectLst>
-            </a:endParaRPr>
           </a:p>
         </p:txBody>
       </p:sp>
@@ -7069,7 +6959,7 @@
               <a:buChar char="•"/>
             </a:pPr>
             <a:r>
-              <a:rPr lang="en-US" sz="2800" b="1" dirty="0" smtClean="0"/>
+              <a:rPr lang="en-US" sz="2800" b="1" dirty="0"/>
               <a:t>Game Evaluation</a:t>
             </a:r>
           </a:p>
@@ -7079,7 +6969,7 @@
               <a:buChar char="•"/>
             </a:pPr>
             <a:r>
-              <a:rPr lang="en-US" sz="2800" b="1" dirty="0" smtClean="0"/>
+              <a:rPr lang="en-US" sz="2800" b="1" dirty="0"/>
               <a:t>Playback Mode</a:t>
             </a:r>
           </a:p>
@@ -7089,7 +6979,7 @@
               <a:buChar char="•"/>
             </a:pPr>
             <a:r>
-              <a:rPr lang="en-US" sz="2800" b="1" dirty="0" smtClean="0"/>
+              <a:rPr lang="en-US" sz="2800" b="1" dirty="0"/>
               <a:t>Testing Mode</a:t>
             </a:r>
           </a:p>
@@ -7099,7 +6989,7 @@
               <a:buChar char="•"/>
             </a:pPr>
             <a:r>
-              <a:rPr lang="en-US" sz="2800" b="1" dirty="0" smtClean="0"/>
+              <a:rPr lang="en-US" sz="2800" b="1" dirty="0"/>
               <a:t>Contests</a:t>
             </a:r>
           </a:p>
@@ -7109,7 +6999,7 @@
               <a:buChar char="•"/>
             </a:pPr>
             <a:r>
-              <a:rPr lang="en-US" sz="2800" b="1" dirty="0" smtClean="0"/>
+              <a:rPr lang="en-US" sz="2800" b="1" dirty="0"/>
               <a:t>Web Development</a:t>
             </a:r>
           </a:p>
@@ -7119,10 +7009,9 @@
               <a:buChar char="•"/>
             </a:pPr>
             <a:r>
-              <a:rPr lang="en-US" sz="2800" b="1" dirty="0" smtClean="0"/>
+              <a:rPr lang="en-US" sz="2800" b="1" dirty="0"/>
               <a:t>Game Challenges</a:t>
             </a:r>
-            <a:endParaRPr lang="en-US" sz="2800" b="1" dirty="0"/>
           </a:p>
         </p:txBody>
       </p:sp>
@@ -7136,13 +7025,6 @@
   <p:clrMapOvr>
     <a:masterClrMapping/>
   </p:clrMapOvr>
-  <p:timing>
-    <p:tnLst>
-      <p:par>
-        <p:cTn id="1" dur="indefinite" restart="never" nodeType="tmRoot"/>
-      </p:par>
-    </p:tnLst>
-  </p:timing>
 </p:sld>
 </file>
 
@@ -7187,7 +7069,7 @@
           <a:p>
             <a:pPr algn="ctr"/>
             <a:r>
-              <a:rPr lang="en-US" sz="5400" b="1" dirty="0" smtClean="0">
+              <a:rPr lang="en-US" sz="5400" b="1" dirty="0">
                 <a:ln w="1905"/>
                 <a:gradFill>
                   <a:gsLst>
@@ -7223,40 +7105,6 @@
               </a:rPr>
               <a:t>Playback Mode</a:t>
             </a:r>
-            <a:endParaRPr lang="en-US" sz="5400" b="1" dirty="0">
-              <a:ln w="1905"/>
-              <a:gradFill>
-                <a:gsLst>
-                  <a:gs pos="0">
-                    <a:schemeClr val="accent6">
-                      <a:shade val="20000"/>
-                      <a:satMod val="200000"/>
-                    </a:schemeClr>
-                  </a:gs>
-                  <a:gs pos="78000">
-                    <a:schemeClr val="accent6">
-                      <a:tint val="90000"/>
-                      <a:shade val="89000"/>
-                      <a:satMod val="220000"/>
-                    </a:schemeClr>
-                  </a:gs>
-                  <a:gs pos="100000">
-                    <a:schemeClr val="accent6">
-                      <a:tint val="12000"/>
-                      <a:satMod val="255000"/>
-                    </a:schemeClr>
-                  </a:gs>
-                </a:gsLst>
-                <a:lin ang="5400000"/>
-              </a:gradFill>
-              <a:effectLst>
-                <a:innerShdw blurRad="69850" dist="43180" dir="5400000">
-                  <a:srgbClr val="000000">
-                    <a:alpha val="65000"/>
-                  </a:srgbClr>
-                </a:innerShdw>
-              </a:effectLst>
-            </a:endParaRPr>
           </a:p>
         </p:txBody>
       </p:sp>
@@ -7287,7 +7135,7 @@
               <a:buChar char="•"/>
             </a:pPr>
             <a:r>
-              <a:rPr lang="en-US" sz="3600" b="1" dirty="0" smtClean="0"/>
+              <a:rPr lang="en-US" sz="3600" b="1" dirty="0"/>
               <a:t>View completed matches</a:t>
             </a:r>
           </a:p>
@@ -7297,7 +7145,7 @@
               <a:buChar char="•"/>
             </a:pPr>
             <a:r>
-              <a:rPr lang="en-US" sz="3600" b="1" dirty="0" smtClean="0"/>
+              <a:rPr lang="en-US" sz="3600" b="1" dirty="0"/>
               <a:t>Speed Slider</a:t>
             </a:r>
           </a:p>
@@ -7307,7 +7155,7 @@
               <a:buChar char="•"/>
             </a:pPr>
             <a:r>
-              <a:rPr lang="en-US" sz="3600" b="1" dirty="0" smtClean="0"/>
+              <a:rPr lang="en-US" sz="3600" b="1" dirty="0"/>
               <a:t>Turn by turn</a:t>
             </a:r>
           </a:p>
@@ -7317,7 +7165,7 @@
               <a:buChar char="•"/>
             </a:pPr>
             <a:r>
-              <a:rPr lang="en-US" sz="3600" b="1" dirty="0" smtClean="0"/>
+              <a:rPr lang="en-US" sz="3600" b="1" dirty="0"/>
               <a:t>Easy to use</a:t>
             </a:r>
           </a:p>
@@ -7326,7 +7174,7 @@
               <a:buFont typeface="Arial" panose="020B0604020202020204" pitchFamily="34" charset="0"/>
               <a:buChar char="•"/>
             </a:pPr>
-            <a:endParaRPr lang="en-US" sz="3600" b="1" dirty="0" smtClean="0"/>
+            <a:endParaRPr lang="en-US" sz="3600" b="1" dirty="0"/>
           </a:p>
         </p:txBody>
       </p:sp>
@@ -7340,13 +7188,6 @@
   <p:clrMapOvr>
     <a:masterClrMapping/>
   </p:clrMapOvr>
-  <p:timing>
-    <p:tnLst>
-      <p:par>
-        <p:cTn id="1" dur="indefinite" restart="never" nodeType="tmRoot"/>
-      </p:par>
-    </p:tnLst>
-  </p:timing>
 </p:sld>
 </file>
 
@@ -8456,13 +8297,6 @@
   <p:clrMapOvr>
     <a:masterClrMapping/>
   </p:clrMapOvr>
-  <p:timing>
-    <p:tnLst>
-      <p:par>
-        <p:cTn id="1" dur="indefinite" restart="never" nodeType="tmRoot"/>
-      </p:par>
-    </p:tnLst>
-  </p:timing>
 </p:sld>
 </file>
 
@@ -9572,13 +9406,6 @@
   <p:clrMapOvr>
     <a:masterClrMapping/>
   </p:clrMapOvr>
-  <p:timing>
-    <p:tnLst>
-      <p:par>
-        <p:cTn id="1" dur="indefinite" restart="never" nodeType="tmRoot"/>
-      </p:par>
-    </p:tnLst>
-  </p:timing>
 </p:sld>
 </file>
 
@@ -10688,13 +10515,6 @@
   <p:clrMapOvr>
     <a:masterClrMapping/>
   </p:clrMapOvr>
-  <p:timing>
-    <p:tnLst>
-      <p:par>
-        <p:cTn id="1" dur="indefinite" restart="never" nodeType="tmRoot"/>
-      </p:par>
-    </p:tnLst>
-  </p:timing>
 </p:sld>
 </file>
 
@@ -11804,13 +11624,6 @@
   <p:clrMapOvr>
     <a:masterClrMapping/>
   </p:clrMapOvr>
-  <p:timing>
-    <p:tnLst>
-      <p:par>
-        <p:cTn id="1" dur="indefinite" restart="never" nodeType="tmRoot"/>
-      </p:par>
-    </p:tnLst>
-  </p:timing>
 </p:sld>
 </file>
 

</xml_diff>

<commit_message>
Next update to presentation
There's only 1 real change I think we need to make still, and that's to
find a good picture to represent the different teams.
</commit_message>
<xml_diff>
--- a/Presentation Materials/Capstone Presentation.pptx
+++ b/Presentation Materials/Capstone Presentation.pptx
@@ -27,8 +27,9 @@
     <p:sldId id="272" r:id="rId21"/>
     <p:sldId id="273" r:id="rId22"/>
     <p:sldId id="275" r:id="rId23"/>
-    <p:sldId id="282" r:id="rId24"/>
-    <p:sldId id="284" r:id="rId25"/>
+    <p:sldId id="286" r:id="rId24"/>
+    <p:sldId id="282" r:id="rId25"/>
+    <p:sldId id="284" r:id="rId26"/>
   </p:sldIdLst>
   <p:sldSz cx="9144000" cy="6858000" type="screen4x3"/>
   <p:notesSz cx="6858000" cy="9144000"/>
@@ -3853,7 +3854,7 @@
         </p:nvSpPr>
         <p:spPr>
           <a:xfrm>
-            <a:off x="798081" y="228600"/>
+            <a:off x="798078" y="1752600"/>
             <a:ext cx="7547835" cy="1938992"/>
           </a:xfrm>
           <a:prstGeom prst="rect">
@@ -3912,7 +3913,7 @@
               <a:t>Bot!Battle</a:t>
             </a:r>
             <a:r>
-              <a:rPr lang="en-US" sz="6000" b="1" cap="none" spc="50" smtClean="0">
+              <a:rPr lang="en-US" sz="6000" b="1" cap="none" spc="50" dirty="0" smtClean="0">
                 <a:ln w="11430"/>
                 <a:gradFill>
                   <a:gsLst>
@@ -3940,32 +3941,6 @@
               </a:rPr>
               <a:t>!:</a:t>
             </a:r>
-            <a:endParaRPr lang="en-US" sz="6000" b="1" cap="none" spc="50" dirty="0" smtClean="0">
-              <a:ln w="11430"/>
-              <a:gradFill>
-                <a:gsLst>
-                  <a:gs pos="25000">
-                    <a:schemeClr val="accent2">
-                      <a:satMod val="155000"/>
-                    </a:schemeClr>
-                  </a:gs>
-                  <a:gs pos="100000">
-                    <a:schemeClr val="accent2">
-                      <a:shade val="45000"/>
-                      <a:satMod val="165000"/>
-                    </a:schemeClr>
-                  </a:gs>
-                </a:gsLst>
-                <a:lin ang="5400000"/>
-              </a:gradFill>
-              <a:effectLst>
-                <a:outerShdw blurRad="76200" dist="50800" dir="5400000" algn="tl" rotWithShape="0">
-                  <a:srgbClr val="000000">
-                    <a:alpha val="65000"/>
-                  </a:srgbClr>
-                </a:outerShdw>
-              </a:effectLst>
-            </a:endParaRPr>
           </a:p>
           <a:p>
             <a:pPr algn="ctr"/>
@@ -4035,8 +4010,8 @@
         </p:nvSpPr>
         <p:spPr>
           <a:xfrm>
-            <a:off x="2640220" y="2286000"/>
-            <a:ext cx="3863558" cy="3170099"/>
+            <a:off x="1650076" y="3962400"/>
+            <a:ext cx="5843844" cy="1384995"/>
           </a:xfrm>
           <a:prstGeom prst="rect">
             <a:avLst/>
@@ -4051,414 +4026,262 @@
           <a:p>
             <a:pPr algn="ctr"/>
             <a:r>
-              <a:rPr lang="en-US" sz="4000" b="1" cap="none" spc="0" dirty="0" smtClean="0">
-                <a:ln w="24500" cmpd="dbl">
-                  <a:solidFill>
-                    <a:schemeClr val="accent2">
-                      <a:shade val="85000"/>
-                      <a:satMod val="155000"/>
-                    </a:schemeClr>
-                  </a:solidFill>
-                  <a:prstDash val="solid"/>
-                  <a:miter lim="800000"/>
-                </a:ln>
+              <a:rPr lang="en-US" sz="2800" b="1" dirty="0" smtClean="0">
+                <a:ln w="1905"/>
                 <a:gradFill>
                   <a:gsLst>
-                    <a:gs pos="10000">
-                      <a:schemeClr val="accent2">
-                        <a:tint val="10000"/>
-                        <a:satMod val="155000"/>
+                    <a:gs pos="0">
+                      <a:schemeClr val="accent6">
+                        <a:shade val="20000"/>
+                        <a:satMod val="200000"/>
                       </a:schemeClr>
                     </a:gs>
-                    <a:gs pos="60000">
-                      <a:schemeClr val="accent2">
-                        <a:tint val="30000"/>
-                        <a:satMod val="155000"/>
+                    <a:gs pos="78000">
+                      <a:schemeClr val="accent6">
+                        <a:tint val="90000"/>
+                        <a:shade val="89000"/>
+                        <a:satMod val="220000"/>
                       </a:schemeClr>
                     </a:gs>
                     <a:gs pos="100000">
-                      <a:schemeClr val="accent2">
-                        <a:tint val="73000"/>
-                        <a:satMod val="155000"/>
+                      <a:schemeClr val="accent6">
+                        <a:tint val="12000"/>
+                        <a:satMod val="255000"/>
                       </a:schemeClr>
                     </a:gs>
                   </a:gsLst>
                   <a:lin ang="5400000"/>
                 </a:gradFill>
                 <a:effectLst>
-                  <a:outerShdw blurRad="38100" dist="38100" dir="7020000" algn="tl">
+                  <a:innerShdw blurRad="69850" dist="43180" dir="5400000">
                     <a:srgbClr val="000000">
-                      <a:alpha val="35000"/>
+                      <a:alpha val="65000"/>
                     </a:srgbClr>
-                  </a:outerShdw>
+                  </a:innerShdw>
                 </a:effectLst>
               </a:rPr>
               <a:t>Josiah </a:t>
             </a:r>
             <a:r>
-              <a:rPr lang="en-US" sz="4000" b="1" cap="none" spc="0" dirty="0" err="1" smtClean="0">
-                <a:ln w="24500" cmpd="dbl">
-                  <a:solidFill>
-                    <a:schemeClr val="accent2">
-                      <a:shade val="85000"/>
-                      <a:satMod val="155000"/>
-                    </a:schemeClr>
-                  </a:solidFill>
-                  <a:prstDash val="solid"/>
-                  <a:miter lim="800000"/>
-                </a:ln>
+              <a:rPr lang="en-US" sz="2800" b="1" dirty="0" err="1" smtClean="0">
+                <a:ln w="1905"/>
                 <a:gradFill>
                   <a:gsLst>
-                    <a:gs pos="10000">
-                      <a:schemeClr val="accent2">
-                        <a:tint val="10000"/>
-                        <a:satMod val="155000"/>
+                    <a:gs pos="0">
+                      <a:schemeClr val="accent6">
+                        <a:shade val="20000"/>
+                        <a:satMod val="200000"/>
                       </a:schemeClr>
                     </a:gs>
-                    <a:gs pos="60000">
-                      <a:schemeClr val="accent2">
-                        <a:tint val="30000"/>
-                        <a:satMod val="155000"/>
+                    <a:gs pos="78000">
+                      <a:schemeClr val="accent6">
+                        <a:tint val="90000"/>
+                        <a:shade val="89000"/>
+                        <a:satMod val="220000"/>
                       </a:schemeClr>
                     </a:gs>
                     <a:gs pos="100000">
-                      <a:schemeClr val="accent2">
-                        <a:tint val="73000"/>
-                        <a:satMod val="155000"/>
+                      <a:schemeClr val="accent6">
+                        <a:tint val="12000"/>
+                        <a:satMod val="255000"/>
                       </a:schemeClr>
                     </a:gs>
                   </a:gsLst>
                   <a:lin ang="5400000"/>
                 </a:gradFill>
                 <a:effectLst>
-                  <a:outerShdw blurRad="38100" dist="38100" dir="7020000" algn="tl">
+                  <a:innerShdw blurRad="69850" dist="43180" dir="5400000">
                     <a:srgbClr val="000000">
-                      <a:alpha val="35000"/>
+                      <a:alpha val="65000"/>
                     </a:srgbClr>
-                  </a:outerShdw>
+                  </a:innerShdw>
                 </a:effectLst>
               </a:rPr>
               <a:t>Hertzler</a:t>
             </a:r>
-            <a:endParaRPr lang="en-US" sz="4000" b="1" cap="none" spc="0" dirty="0" smtClean="0">
-              <a:ln w="24500" cmpd="dbl">
-                <a:solidFill>
-                  <a:schemeClr val="accent2">
-                    <a:shade val="85000"/>
-                    <a:satMod val="155000"/>
-                  </a:schemeClr>
-                </a:solidFill>
-                <a:prstDash val="solid"/>
-                <a:miter lim="800000"/>
-              </a:ln>
+            <a:endParaRPr lang="en-US" sz="2800" b="1" dirty="0" smtClean="0">
+              <a:ln w="1905"/>
               <a:gradFill>
                 <a:gsLst>
-                  <a:gs pos="10000">
-                    <a:schemeClr val="accent2">
-                      <a:tint val="10000"/>
-                      <a:satMod val="155000"/>
+                  <a:gs pos="0">
+                    <a:schemeClr val="accent6">
+                      <a:shade val="20000"/>
+                      <a:satMod val="200000"/>
                     </a:schemeClr>
                   </a:gs>
-                  <a:gs pos="60000">
-                    <a:schemeClr val="accent2">
-                      <a:tint val="30000"/>
-                      <a:satMod val="155000"/>
+                  <a:gs pos="78000">
+                    <a:schemeClr val="accent6">
+                      <a:tint val="90000"/>
+                      <a:shade val="89000"/>
+                      <a:satMod val="220000"/>
                     </a:schemeClr>
                   </a:gs>
                   <a:gs pos="100000">
-                    <a:schemeClr val="accent2">
-                      <a:tint val="73000"/>
-                      <a:satMod val="155000"/>
+                    <a:schemeClr val="accent6">
+                      <a:tint val="12000"/>
+                      <a:satMod val="255000"/>
                     </a:schemeClr>
                   </a:gs>
                 </a:gsLst>
                 <a:lin ang="5400000"/>
               </a:gradFill>
               <a:effectLst>
-                <a:outerShdw blurRad="38100" dist="38100" dir="7020000" algn="tl">
+                <a:innerShdw blurRad="69850" dist="43180" dir="5400000">
                   <a:srgbClr val="000000">
-                    <a:alpha val="35000"/>
+                    <a:alpha val="65000"/>
                   </a:srgbClr>
-                </a:outerShdw>
+                </a:innerShdw>
               </a:effectLst>
             </a:endParaRPr>
           </a:p>
           <a:p>
             <a:pPr algn="ctr"/>
             <a:r>
-              <a:rPr lang="en-US" sz="4000" b="1" dirty="0" err="1" smtClean="0">
-                <a:ln w="24500" cmpd="dbl">
-                  <a:solidFill>
-                    <a:schemeClr val="accent2">
-                      <a:shade val="85000"/>
-                      <a:satMod val="155000"/>
-                    </a:schemeClr>
-                  </a:solidFill>
-                  <a:prstDash val="solid"/>
-                  <a:miter lim="800000"/>
-                </a:ln>
+              <a:rPr lang="en-US" sz="2800" b="1" dirty="0" err="1" smtClean="0">
+                <a:ln w="1905"/>
                 <a:gradFill>
                   <a:gsLst>
-                    <a:gs pos="10000">
-                      <a:schemeClr val="accent2">
-                        <a:tint val="10000"/>
-                        <a:satMod val="155000"/>
+                    <a:gs pos="0">
+                      <a:schemeClr val="accent6">
+                        <a:shade val="20000"/>
+                        <a:satMod val="200000"/>
                       </a:schemeClr>
                     </a:gs>
-                    <a:gs pos="60000">
-                      <a:schemeClr val="accent2">
-                        <a:tint val="30000"/>
-                        <a:satMod val="155000"/>
+                    <a:gs pos="78000">
+                      <a:schemeClr val="accent6">
+                        <a:tint val="90000"/>
+                        <a:shade val="89000"/>
+                        <a:satMod val="220000"/>
                       </a:schemeClr>
                     </a:gs>
                     <a:gs pos="100000">
-                      <a:schemeClr val="accent2">
-                        <a:tint val="73000"/>
-                        <a:satMod val="155000"/>
+                      <a:schemeClr val="accent6">
+                        <a:tint val="12000"/>
+                        <a:satMod val="255000"/>
                       </a:schemeClr>
                     </a:gs>
                   </a:gsLst>
                   <a:lin ang="5400000"/>
                 </a:gradFill>
                 <a:effectLst>
-                  <a:outerShdw blurRad="38100" dist="38100" dir="7020000" algn="tl">
+                  <a:innerShdw blurRad="69850" dist="43180" dir="5400000">
                     <a:srgbClr val="000000">
-                      <a:alpha val="35000"/>
+                      <a:alpha val="65000"/>
                     </a:srgbClr>
-                  </a:outerShdw>
+                  </a:innerShdw>
                 </a:effectLst>
               </a:rPr>
               <a:t>Taha</a:t>
             </a:r>
             <a:r>
-              <a:rPr lang="en-US" sz="4000" b="1" dirty="0" smtClean="0">
-                <a:ln w="24500" cmpd="dbl">
-                  <a:solidFill>
-                    <a:schemeClr val="accent2">
-                      <a:shade val="85000"/>
-                      <a:satMod val="155000"/>
-                    </a:schemeClr>
-                  </a:solidFill>
-                  <a:prstDash val="solid"/>
-                  <a:miter lim="800000"/>
-                </a:ln>
+              <a:rPr lang="en-US" sz="2800" b="1" dirty="0" smtClean="0">
+                <a:ln w="1905"/>
                 <a:gradFill>
                   <a:gsLst>
-                    <a:gs pos="10000">
-                      <a:schemeClr val="accent2">
-                        <a:tint val="10000"/>
-                        <a:satMod val="155000"/>
+                    <a:gs pos="0">
+                      <a:schemeClr val="accent6">
+                        <a:shade val="20000"/>
+                        <a:satMod val="200000"/>
                       </a:schemeClr>
                     </a:gs>
-                    <a:gs pos="60000">
-                      <a:schemeClr val="accent2">
-                        <a:tint val="30000"/>
-                        <a:satMod val="155000"/>
+                    <a:gs pos="78000">
+                      <a:schemeClr val="accent6">
+                        <a:tint val="90000"/>
+                        <a:shade val="89000"/>
+                        <a:satMod val="220000"/>
                       </a:schemeClr>
                     </a:gs>
                     <a:gs pos="100000">
-                      <a:schemeClr val="accent2">
-                        <a:tint val="73000"/>
-                        <a:satMod val="155000"/>
+                      <a:schemeClr val="accent6">
+                        <a:tint val="12000"/>
+                        <a:satMod val="255000"/>
                       </a:schemeClr>
                     </a:gs>
                   </a:gsLst>
                   <a:lin ang="5400000"/>
                 </a:gradFill>
                 <a:effectLst>
-                  <a:outerShdw blurRad="38100" dist="38100" dir="7020000" algn="tl">
+                  <a:innerShdw blurRad="69850" dist="43180" dir="5400000">
                     <a:srgbClr val="000000">
-                      <a:alpha val="35000"/>
+                      <a:alpha val="65000"/>
                     </a:srgbClr>
-                  </a:outerShdw>
+                  </a:innerShdw>
                 </a:effectLst>
               </a:rPr>
-              <a:t> Siddique</a:t>
+              <a:t> Siddique      Jack McFann</a:t>
             </a:r>
           </a:p>
           <a:p>
             <a:pPr algn="ctr"/>
             <a:r>
-              <a:rPr lang="en-US" sz="4000" b="1" cap="none" spc="0" dirty="0" smtClean="0">
-                <a:ln w="24500" cmpd="dbl">
-                  <a:solidFill>
-                    <a:schemeClr val="accent2">
-                      <a:shade val="85000"/>
-                      <a:satMod val="155000"/>
-                    </a:schemeClr>
-                  </a:solidFill>
-                  <a:prstDash val="solid"/>
-                  <a:miter lim="800000"/>
-                </a:ln>
+              <a:rPr lang="en-US" sz="2800" b="1" dirty="0" smtClean="0">
+                <a:ln w="1905"/>
                 <a:gradFill>
                   <a:gsLst>
-                    <a:gs pos="10000">
-                      <a:schemeClr val="accent2">
-                        <a:tint val="10000"/>
-                        <a:satMod val="155000"/>
+                    <a:gs pos="0">
+                      <a:schemeClr val="accent6">
+                        <a:shade val="20000"/>
+                        <a:satMod val="200000"/>
                       </a:schemeClr>
                     </a:gs>
-                    <a:gs pos="60000">
-                      <a:schemeClr val="accent2">
-                        <a:tint val="30000"/>
-                        <a:satMod val="155000"/>
+                    <a:gs pos="78000">
+                      <a:schemeClr val="accent6">
+                        <a:tint val="90000"/>
+                        <a:shade val="89000"/>
+                        <a:satMod val="220000"/>
                       </a:schemeClr>
                     </a:gs>
                     <a:gs pos="100000">
-                      <a:schemeClr val="accent2">
-                        <a:tint val="73000"/>
-                        <a:satMod val="155000"/>
+                      <a:schemeClr val="accent6">
+                        <a:tint val="12000"/>
+                        <a:satMod val="255000"/>
                       </a:schemeClr>
                     </a:gs>
                   </a:gsLst>
                   <a:lin ang="5400000"/>
                 </a:gradFill>
                 <a:effectLst>
-                  <a:outerShdw blurRad="38100" dist="38100" dir="7020000" algn="tl">
+                  <a:innerShdw blurRad="69850" dist="43180" dir="5400000">
                     <a:srgbClr val="000000">
-                      <a:alpha val="35000"/>
+                      <a:alpha val="65000"/>
                     </a:srgbClr>
-                  </a:outerShdw>
+                  </a:innerShdw>
                 </a:effectLst>
               </a:rPr>
-              <a:t>Jack McFann</a:t>
+              <a:t>  Tom Hoffman       Sawyer Brown</a:t>
             </a:r>
-          </a:p>
-          <a:p>
-            <a:pPr algn="ctr"/>
-            <a:r>
-              <a:rPr lang="en-US" sz="4000" b="1" dirty="0" smtClean="0">
-                <a:ln w="24500" cmpd="dbl">
-                  <a:solidFill>
-                    <a:schemeClr val="accent2">
-                      <a:shade val="85000"/>
-                      <a:satMod val="155000"/>
-                    </a:schemeClr>
-                  </a:solidFill>
-                  <a:prstDash val="solid"/>
-                  <a:miter lim="800000"/>
-                </a:ln>
-                <a:gradFill>
-                  <a:gsLst>
-                    <a:gs pos="10000">
-                      <a:schemeClr val="accent2">
-                        <a:tint val="10000"/>
-                        <a:satMod val="155000"/>
-                      </a:schemeClr>
-                    </a:gs>
-                    <a:gs pos="60000">
-                      <a:schemeClr val="accent2">
-                        <a:tint val="30000"/>
-                        <a:satMod val="155000"/>
-                      </a:schemeClr>
-                    </a:gs>
-                    <a:gs pos="100000">
-                      <a:schemeClr val="accent2">
-                        <a:tint val="73000"/>
-                        <a:satMod val="155000"/>
-                      </a:schemeClr>
-                    </a:gs>
-                  </a:gsLst>
-                  <a:lin ang="5400000"/>
-                </a:gradFill>
-                <a:effectLst>
-                  <a:outerShdw blurRad="38100" dist="38100" dir="7020000" algn="tl">
-                    <a:srgbClr val="000000">
-                      <a:alpha val="35000"/>
-                    </a:srgbClr>
-                  </a:outerShdw>
-                </a:effectLst>
-              </a:rPr>
-              <a:t>Tom Hoffman</a:t>
-            </a:r>
-          </a:p>
-          <a:p>
-            <a:pPr algn="ctr"/>
-            <a:r>
-              <a:rPr lang="en-US" sz="4000" b="1" cap="none" spc="0" dirty="0" smtClean="0">
-                <a:ln w="24500" cmpd="dbl">
-                  <a:solidFill>
-                    <a:schemeClr val="accent2">
-                      <a:shade val="85000"/>
-                      <a:satMod val="155000"/>
-                    </a:schemeClr>
-                  </a:solidFill>
-                  <a:prstDash val="solid"/>
-                  <a:miter lim="800000"/>
-                </a:ln>
-                <a:gradFill>
-                  <a:gsLst>
-                    <a:gs pos="10000">
-                      <a:schemeClr val="accent2">
-                        <a:tint val="10000"/>
-                        <a:satMod val="155000"/>
-                      </a:schemeClr>
-                    </a:gs>
-                    <a:gs pos="60000">
-                      <a:schemeClr val="accent2">
-                        <a:tint val="30000"/>
-                        <a:satMod val="155000"/>
-                      </a:schemeClr>
-                    </a:gs>
-                    <a:gs pos="100000">
-                      <a:schemeClr val="accent2">
-                        <a:tint val="73000"/>
-                        <a:satMod val="155000"/>
-                      </a:schemeClr>
-                    </a:gs>
-                  </a:gsLst>
-                  <a:lin ang="5400000"/>
-                </a:gradFill>
-                <a:effectLst>
-                  <a:outerShdw blurRad="38100" dist="38100" dir="7020000" algn="tl">
-                    <a:srgbClr val="000000">
-                      <a:alpha val="35000"/>
-                    </a:srgbClr>
-                  </a:outerShdw>
-                </a:effectLst>
-              </a:rPr>
-              <a:t>Sawyer Brown</a:t>
-            </a:r>
-            <a:endParaRPr lang="en-US" sz="4000" b="1" cap="none" spc="0" dirty="0">
-              <a:ln w="24500" cmpd="dbl">
-                <a:solidFill>
-                  <a:schemeClr val="accent2">
-                    <a:shade val="85000"/>
-                    <a:satMod val="155000"/>
-                  </a:schemeClr>
-                </a:solidFill>
-                <a:prstDash val="solid"/>
-                <a:miter lim="800000"/>
-              </a:ln>
+            <a:endParaRPr lang="en-US" sz="2800" b="1" dirty="0">
+              <a:ln w="1905"/>
               <a:gradFill>
                 <a:gsLst>
-                  <a:gs pos="10000">
-                    <a:schemeClr val="accent2">
-                      <a:tint val="10000"/>
-                      <a:satMod val="155000"/>
+                  <a:gs pos="0">
+                    <a:schemeClr val="accent6">
+                      <a:shade val="20000"/>
+                      <a:satMod val="200000"/>
                     </a:schemeClr>
                   </a:gs>
-                  <a:gs pos="60000">
-                    <a:schemeClr val="accent2">
-                      <a:tint val="30000"/>
-                      <a:satMod val="155000"/>
+                  <a:gs pos="78000">
+                    <a:schemeClr val="accent6">
+                      <a:tint val="90000"/>
+                      <a:shade val="89000"/>
+                      <a:satMod val="220000"/>
                     </a:schemeClr>
                   </a:gs>
                   <a:gs pos="100000">
-                    <a:schemeClr val="accent2">
-                      <a:tint val="73000"/>
-                      <a:satMod val="155000"/>
+                    <a:schemeClr val="accent6">
+                      <a:tint val="12000"/>
+                      <a:satMod val="255000"/>
                     </a:schemeClr>
                   </a:gs>
                 </a:gsLst>
                 <a:lin ang="5400000"/>
               </a:gradFill>
               <a:effectLst>
-                <a:outerShdw blurRad="38100" dist="38100" dir="7020000" algn="tl">
+                <a:innerShdw blurRad="69850" dist="43180" dir="5400000">
                   <a:srgbClr val="000000">
-                    <a:alpha val="35000"/>
+                    <a:alpha val="65000"/>
                   </a:srgbClr>
-                </a:outerShdw>
+                </a:innerShdw>
               </a:effectLst>
             </a:endParaRPr>
           </a:p>
@@ -11408,7 +11231,7 @@
         </p:nvSpPr>
         <p:spPr>
           <a:xfrm>
-            <a:off x="601282" y="1265107"/>
+            <a:off x="601282" y="1371600"/>
             <a:ext cx="7628318" cy="4524315"/>
           </a:xfrm>
           <a:prstGeom prst="rect">
@@ -11428,7 +11251,7 @@
             </a:pPr>
             <a:r>
               <a:rPr lang="en-US" sz="3600" b="1" dirty="0" smtClean="0"/>
-              <a:t>Debugging Mode</a:t>
+              <a:t>Debugging Display</a:t>
             </a:r>
             <a:endParaRPr lang="en-US" sz="3600" b="1" dirty="0"/>
           </a:p>
@@ -11439,7 +11262,7 @@
             </a:pPr>
             <a:r>
               <a:rPr lang="en-US" sz="3600" b="1" dirty="0" smtClean="0"/>
-              <a:t>Update bot each turn</a:t>
+              <a:t>Alter your bot</a:t>
             </a:r>
           </a:p>
           <a:p>
@@ -11469,7 +11292,7 @@
             </a:pPr>
             <a:r>
               <a:rPr lang="en-US" sz="3600" b="1" dirty="0" smtClean="0"/>
-              <a:t>Test against other bots</a:t>
+              <a:t>Test other bots</a:t>
             </a:r>
           </a:p>
           <a:p>
@@ -13485,6 +13308,140 @@
 </file>
 
 <file path=ppt/slides/slide22.xml><?xml version="1.0" encoding="utf-8"?>
+<p:sld xmlns:a="http://schemas.openxmlformats.org/drawingml/2006/main" xmlns:r="http://schemas.openxmlformats.org/officeDocument/2006/relationships" xmlns:p="http://schemas.openxmlformats.org/presentationml/2006/main">
+  <p:cSld>
+    <p:spTree>
+      <p:nvGrpSpPr>
+        <p:cNvPr id="1" name=""/>
+        <p:cNvGrpSpPr/>
+        <p:nvPr/>
+      </p:nvGrpSpPr>
+      <p:grpSpPr>
+        <a:xfrm>
+          <a:off x="0" y="0"/>
+          <a:ext cx="0" cy="0"/>
+          <a:chOff x="0" y="0"/>
+          <a:chExt cx="0" cy="0"/>
+        </a:xfrm>
+      </p:grpSpPr>
+      <p:sp>
+        <p:nvSpPr>
+          <p:cNvPr id="2" name="Rectangle 1"/>
+          <p:cNvSpPr/>
+          <p:nvPr/>
+        </p:nvSpPr>
+        <p:spPr>
+          <a:xfrm>
+            <a:off x="1394605" y="2409825"/>
+            <a:ext cx="5993950" cy="923330"/>
+          </a:xfrm>
+          <a:prstGeom prst="rect">
+            <a:avLst/>
+          </a:prstGeom>
+          <a:noFill/>
+        </p:spPr>
+        <p:txBody>
+          <a:bodyPr wrap="none" lIns="91440" tIns="45720" rIns="91440" bIns="45720">
+            <a:spAutoFit/>
+          </a:bodyPr>
+          <a:lstStyle/>
+          <a:p>
+            <a:pPr algn="ctr"/>
+            <a:r>
+              <a:rPr lang="en-US" sz="5400" b="1" dirty="0" smtClean="0">
+                <a:ln w="1905"/>
+                <a:gradFill>
+                  <a:gsLst>
+                    <a:gs pos="0">
+                      <a:schemeClr val="accent6">
+                        <a:shade val="20000"/>
+                        <a:satMod val="200000"/>
+                      </a:schemeClr>
+                    </a:gs>
+                    <a:gs pos="78000">
+                      <a:schemeClr val="accent6">
+                        <a:tint val="90000"/>
+                        <a:shade val="89000"/>
+                        <a:satMod val="220000"/>
+                      </a:schemeClr>
+                    </a:gs>
+                    <a:gs pos="100000">
+                      <a:schemeClr val="accent6">
+                        <a:tint val="12000"/>
+                        <a:satMod val="255000"/>
+                      </a:schemeClr>
+                    </a:gs>
+                  </a:gsLst>
+                  <a:lin ang="5400000"/>
+                </a:gradFill>
+                <a:effectLst>
+                  <a:innerShdw blurRad="69850" dist="43180" dir="5400000">
+                    <a:srgbClr val="000000">
+                      <a:alpha val="65000"/>
+                    </a:srgbClr>
+                  </a:innerShdw>
+                </a:effectLst>
+              </a:rPr>
+              <a:t>Game Challenges</a:t>
+            </a:r>
+            <a:endParaRPr lang="en-US" sz="5400" b="1" dirty="0">
+              <a:ln w="1905"/>
+              <a:gradFill>
+                <a:gsLst>
+                  <a:gs pos="0">
+                    <a:schemeClr val="accent6">
+                      <a:shade val="20000"/>
+                      <a:satMod val="200000"/>
+                    </a:schemeClr>
+                  </a:gs>
+                  <a:gs pos="78000">
+                    <a:schemeClr val="accent6">
+                      <a:tint val="90000"/>
+                      <a:shade val="89000"/>
+                      <a:satMod val="220000"/>
+                    </a:schemeClr>
+                  </a:gs>
+                  <a:gs pos="100000">
+                    <a:schemeClr val="accent6">
+                      <a:tint val="12000"/>
+                      <a:satMod val="255000"/>
+                    </a:schemeClr>
+                  </a:gs>
+                </a:gsLst>
+                <a:lin ang="5400000"/>
+              </a:gradFill>
+              <a:effectLst>
+                <a:innerShdw blurRad="69850" dist="43180" dir="5400000">
+                  <a:srgbClr val="000000">
+                    <a:alpha val="65000"/>
+                  </a:srgbClr>
+                </a:innerShdw>
+              </a:effectLst>
+            </a:endParaRPr>
+          </a:p>
+        </p:txBody>
+      </p:sp>
+    </p:spTree>
+    <p:extLst>
+      <p:ext uri="{BB962C8B-B14F-4D97-AF65-F5344CB8AC3E}">
+        <p14:creationId xmlns:p14="http://schemas.microsoft.com/office/powerpoint/2010/main" val="736569533"/>
+      </p:ext>
+    </p:extLst>
+  </p:cSld>
+  <p:clrMapOvr>
+    <a:masterClrMapping/>
+  </p:clrMapOvr>
+  <p:timing>
+    <p:tnLst>
+      <p:par>
+        <p:cTn id="1" dur="indefinite" restart="never" nodeType="tmRoot"/>
+      </p:par>
+    </p:tnLst>
+  </p:timing>
+</p:sld>
+</file>
+
+<file path=ppt/slides/slide23.xml><?xml version="1.0" encoding="utf-8"?>
 <p:sld xmlns:a="http://schemas.openxmlformats.org/drawingml/2006/main" xmlns:r="http://schemas.openxmlformats.org/officeDocument/2006/relationships" xmlns:p="http://schemas.openxmlformats.org/presentationml/2006/main">
   <p:cSld>
     <p:spTree>
@@ -13607,7 +13564,7 @@
         <p:spPr>
           <a:xfrm>
             <a:off x="601282" y="1603940"/>
-            <a:ext cx="7628318" cy="3416320"/>
+            <a:ext cx="7628318" cy="2862322"/>
           </a:xfrm>
           <a:prstGeom prst="rect">
             <a:avLst/>
@@ -13629,16 +13586,6 @@
               <a:t>Math Based Game Challenge</a:t>
             </a:r>
             <a:endParaRPr lang="en-US" sz="3600" b="1" dirty="0"/>
-          </a:p>
-          <a:p>
-            <a:pPr marL="457200" indent="-457200">
-              <a:buFont typeface="Arial" panose="020B0604020202020204" pitchFamily="34" charset="0"/>
-              <a:buChar char="•"/>
-            </a:pPr>
-            <a:r>
-              <a:rPr lang="en-US" sz="3600" b="1" dirty="0" smtClean="0"/>
-              <a:t>Balance Attack and Defense</a:t>
-            </a:r>
           </a:p>
           <a:p>
             <a:pPr marL="457200" indent="-457200">
@@ -13682,7 +13629,7 @@
     </p:spTree>
     <p:extLst>
       <p:ext uri="{BB962C8B-B14F-4D97-AF65-F5344CB8AC3E}">
-        <p14:creationId xmlns:p14="http://schemas.microsoft.com/office/powerpoint/2010/main" val="736569533"/>
+        <p14:creationId xmlns:p14="http://schemas.microsoft.com/office/powerpoint/2010/main" val="4164846191"/>
       </p:ext>
     </p:extLst>
   </p:cSld>
@@ -13699,7 +13646,7 @@
 </p:sld>
 </file>
 
-<file path=ppt/slides/slide23.xml><?xml version="1.0" encoding="utf-8"?>
+<file path=ppt/slides/slide24.xml><?xml version="1.0" encoding="utf-8"?>
 <p:sld xmlns:a="http://schemas.openxmlformats.org/drawingml/2006/main" xmlns:r="http://schemas.openxmlformats.org/officeDocument/2006/relationships" xmlns:p="http://schemas.openxmlformats.org/presentationml/2006/main">
   <p:cSld>
     <p:spTree>
@@ -14230,7 +14177,7 @@
 </p:sld>
 </file>
 
-<file path=ppt/slides/slide24.xml><?xml version="1.0" encoding="utf-8"?>
+<file path=ppt/slides/slide25.xml><?xml version="1.0" encoding="utf-8"?>
 <p:sld xmlns:a="http://schemas.openxmlformats.org/drawingml/2006/main" xmlns:r="http://schemas.openxmlformats.org/officeDocument/2006/relationships" xmlns:p="http://schemas.openxmlformats.org/presentationml/2006/main">
   <p:cSld>
     <p:spTree>
@@ -14501,7 +14448,7 @@
         </p:blipFill>
         <p:spPr bwMode="auto">
           <a:xfrm>
-            <a:off x="4574929" y="2451996"/>
+            <a:off x="4961318" y="2451996"/>
             <a:ext cx="3660060" cy="2272404"/>
           </a:xfrm>
           <a:prstGeom prst="rect">
@@ -14575,7 +14522,7 @@
         </p:blipFill>
         <p:spPr bwMode="auto">
           <a:xfrm>
-            <a:off x="304800" y="4342745"/>
+            <a:off x="371474" y="4267200"/>
             <a:ext cx="3476625" cy="1352550"/>
           </a:xfrm>
           <a:prstGeom prst="rect">
@@ -14614,7 +14561,7 @@
         </p:nvSpPr>
         <p:spPr>
           <a:xfrm>
-            <a:off x="1295400" y="3374101"/>
+            <a:off x="1815116" y="3524250"/>
             <a:ext cx="4580318" cy="523220"/>
           </a:xfrm>
           <a:prstGeom prst="rect">
@@ -14676,7 +14623,7 @@
         </p:nvSpPr>
         <p:spPr>
           <a:xfrm rot="10800000">
-            <a:off x="-24440" y="3450375"/>
+            <a:off x="371474" y="3588198"/>
             <a:ext cx="4580318" cy="523220"/>
           </a:xfrm>
           <a:prstGeom prst="rect">
@@ -14724,7 +14671,7 @@
         </p:blipFill>
         <p:spPr bwMode="auto">
           <a:xfrm>
-            <a:off x="273240" y="1240665"/>
+            <a:off x="371475" y="1600200"/>
             <a:ext cx="3539744" cy="1608336"/>
           </a:xfrm>
           <a:prstGeom prst="rect">
@@ -14897,8 +14844,8 @@
         </p:nvSpPr>
         <p:spPr>
           <a:xfrm>
-            <a:off x="380999" y="1676400"/>
-            <a:ext cx="8299413" cy="3539430"/>
+            <a:off x="380998" y="1704975"/>
+            <a:ext cx="8299413" cy="2246769"/>
           </a:xfrm>
           <a:prstGeom prst="rect">
             <a:avLst/>
@@ -14931,16 +14878,6 @@
             </a:r>
           </a:p>
           <a:p>
-            <a:pPr marL="914400" lvl="1" indent="-457200">
-              <a:buFont typeface="Arial" panose="020B0604020202020204" pitchFamily="34" charset="0"/>
-              <a:buChar char="•"/>
-            </a:pPr>
-            <a:r>
-              <a:rPr lang="en-US" sz="2800" b="1" dirty="0" smtClean="0"/>
-              <a:t>Server code to find completed games</a:t>
-            </a:r>
-          </a:p>
-          <a:p>
             <a:pPr marL="457200" indent="-457200">
               <a:buFont typeface="Arial" panose="020B0604020202020204" pitchFamily="34" charset="0"/>
               <a:buChar char="•"/>
@@ -14948,26 +14885,6 @@
             <a:r>
               <a:rPr lang="en-US" sz="2800" b="1" dirty="0" smtClean="0"/>
               <a:t>A space for users to test code</a:t>
-            </a:r>
-          </a:p>
-          <a:p>
-            <a:pPr marL="914400" lvl="1" indent="-457200">
-              <a:buFont typeface="Arial" panose="020B0604020202020204" pitchFamily="34" charset="0"/>
-              <a:buChar char="•"/>
-            </a:pPr>
-            <a:r>
-              <a:rPr lang="en-US" sz="2800" b="1" dirty="0" smtClean="0"/>
-              <a:t>Multiple ways to upload</a:t>
-            </a:r>
-          </a:p>
-          <a:p>
-            <a:pPr marL="914400" lvl="1" indent="-457200">
-              <a:buFont typeface="Arial" panose="020B0604020202020204" pitchFamily="34" charset="0"/>
-              <a:buChar char="•"/>
-            </a:pPr>
-            <a:r>
-              <a:rPr lang="en-US" sz="2800" b="1" dirty="0" smtClean="0"/>
-              <a:t>Can edit uploaded code</a:t>
             </a:r>
           </a:p>
           <a:p>
@@ -15414,8 +15331,37 @@
         </p:nvSpPr>
         <p:spPr>
           <a:xfrm>
-            <a:off x="76200" y="1752599"/>
+            <a:off x="152400" y="1752598"/>
             <a:ext cx="7628318" cy="769441"/>
+          </a:xfrm>
+          <a:prstGeom prst="rect">
+            <a:avLst/>
+          </a:prstGeom>
+          <a:noFill/>
+        </p:spPr>
+        <p:txBody>
+          <a:bodyPr wrap="square" rtlCol="0">
+            <a:spAutoFit/>
+          </a:bodyPr>
+          <a:lstStyle/>
+          <a:p>
+            <a:r>
+              <a:rPr lang="en-US" sz="4400" b="1" dirty="0" smtClean="0"/>
+              <a:t>Playback Mode</a:t>
+            </a:r>
+          </a:p>
+        </p:txBody>
+      </p:sp>
+      <p:sp>
+        <p:nvSpPr>
+          <p:cNvPr id="5" name="TextBox 4"/>
+          <p:cNvSpPr txBox="1"/>
+          <p:nvPr/>
+        </p:nvSpPr>
+        <p:spPr>
+          <a:xfrm>
+            <a:off x="4810125" y="1752600"/>
+            <a:ext cx="4876800" cy="769441"/>
           </a:xfrm>
           <a:prstGeom prst="rect">
             <a:avLst/>
@@ -15435,35 +15381,6 @@
           </a:p>
         </p:txBody>
       </p:sp>
-      <p:sp>
-        <p:nvSpPr>
-          <p:cNvPr id="5" name="TextBox 4"/>
-          <p:cNvSpPr txBox="1"/>
-          <p:nvPr/>
-        </p:nvSpPr>
-        <p:spPr>
-          <a:xfrm>
-            <a:off x="4572000" y="1752600"/>
-            <a:ext cx="4876800" cy="769441"/>
-          </a:xfrm>
-          <a:prstGeom prst="rect">
-            <a:avLst/>
-          </a:prstGeom>
-          <a:noFill/>
-        </p:spPr>
-        <p:txBody>
-          <a:bodyPr wrap="square" rtlCol="0">
-            <a:spAutoFit/>
-          </a:bodyPr>
-          <a:lstStyle/>
-          <a:p>
-            <a:r>
-              <a:rPr lang="en-US" sz="4400" b="1" dirty="0" smtClean="0"/>
-              <a:t>Playback Mode</a:t>
-            </a:r>
-          </a:p>
-        </p:txBody>
-      </p:sp>
       <p:pic>
         <p:nvPicPr>
           <p:cNvPr id="6" name="Picture 2"/>
@@ -15487,7 +15404,7 @@
         </p:blipFill>
         <p:spPr bwMode="auto">
           <a:xfrm>
-            <a:off x="4800600" y="2667000"/>
+            <a:off x="4810125" y="2705355"/>
             <a:ext cx="4012979" cy="2316435"/>
           </a:xfrm>
           <a:prstGeom prst="rect">
@@ -15541,7 +15458,7 @@
         </p:blipFill>
         <p:spPr bwMode="auto">
           <a:xfrm>
-            <a:off x="85726" y="2667000"/>
+            <a:off x="381000" y="2681669"/>
             <a:ext cx="3813926" cy="2363805"/>
           </a:xfrm>
           <a:prstGeom prst="rect">

</xml_diff>

<commit_message>
Almost final version of PowerPoint
We're getting close to the end of the tunnel.  Tom still has the picture
of Testing Arena Display left, but otherwise, there's not much left to
change.
</commit_message>
<xml_diff>
--- a/Presentation Materials/Capstone Presentation.pptx
+++ b/Presentation Materials/Capstone Presentation.pptx
@@ -131,7 +131,7 @@
   </p:defaultTextStyle>
   <p:extLst>
     <p:ext uri="{EFAFB233-063F-42B5-8137-9DF3F51BA10A}">
-      <p15:sldGuideLst xmlns:p15="http://schemas.microsoft.com/office/powerpoint/2012/main">
+      <p15:sldGuideLst xmlns:p15="http://schemas.microsoft.com/office/powerpoint/2012/main" xmlns="">
         <p15:guide id="1" orient="horz" pos="2160">
           <p15:clr>
             <a:srgbClr val="A4A3A4"/>
@@ -4228,6 +4228,13 @@
   <p:clrMapOvr>
     <a:masterClrMapping/>
   </p:clrMapOvr>
+  <p:timing>
+    <p:tnLst>
+      <p:par>
+        <p:cTn id="1" dur="indefinite" restart="never" nodeType="tmRoot"/>
+      </p:par>
+    </p:tnLst>
+  </p:timing>
 </p:sld>
 </file>
 
@@ -11002,6 +11009,13 @@
   <p:clrMapOvr>
     <a:masterClrMapping/>
   </p:clrMapOvr>
+  <p:timing>
+    <p:tnLst>
+      <p:par>
+        <p:cTn id="1" dur="indefinite" restart="never" nodeType="tmRoot"/>
+      </p:par>
+    </p:tnLst>
+  </p:timing>
 </p:sld>
 </file>
 
@@ -11195,6 +11209,13 @@
   <p:clrMapOvr>
     <a:masterClrMapping/>
   </p:clrMapOvr>
+  <p:timing>
+    <p:tnLst>
+      <p:par>
+        <p:cTn id="1" dur="indefinite" restart="never" nodeType="tmRoot"/>
+      </p:par>
+    </p:tnLst>
+  </p:timing>
 </p:sld>
 </file>
 
@@ -11277,8 +11298,8 @@
         </p:blipFill>
         <p:spPr>
           <a:xfrm>
-            <a:off x="0" y="304800"/>
-            <a:ext cx="9133755" cy="5225562"/>
+            <a:off x="0" y="76200"/>
+            <a:ext cx="9133755" cy="5715000"/>
           </a:xfrm>
           <a:prstGeom prst="rect">
             <a:avLst/>
@@ -11295,6 +11316,13 @@
   <p:clrMapOvr>
     <a:masterClrMapping/>
   </p:clrMapOvr>
+  <p:timing>
+    <p:tnLst>
+      <p:par>
+        <p:cTn id="1" dur="indefinite" restart="never" nodeType="tmRoot"/>
+      </p:par>
+    </p:tnLst>
+  </p:timing>
 </p:sld>
 </file>
 
@@ -11339,7 +11367,7 @@
         <p:spPr bwMode="auto">
           <a:xfrm>
             <a:off x="0" y="76200"/>
-            <a:ext cx="9144000" cy="5667292"/>
+            <a:ext cx="9144000" cy="5715000"/>
           </a:xfrm>
           <a:prstGeom prst="rect">
             <a:avLst/>
@@ -11422,6 +11450,114 @@
           <a:xfrm>
             <a:off x="2590800" y="1524000"/>
             <a:ext cx="5363003" cy="3581400"/>
+          </a:xfrm>
+          <a:prstGeom prst="rect">
+            <a:avLst/>
+          </a:prstGeom>
+          <a:noFill/>
+          <a:ln>
+            <a:noFill/>
+          </a:ln>
+          <a:extLst>
+            <a:ext uri="{909E8E84-426E-40DD-AFC4-6F175D3DCCD1}">
+              <a14:hiddenFill xmlns:a14="http://schemas.microsoft.com/office/drawing/2010/main">
+                <a:solidFill>
+                  <a:schemeClr val="accent1"/>
+                </a:solidFill>
+              </a14:hiddenFill>
+            </a:ext>
+            <a:ext uri="{91240B29-F687-4F45-9708-019B960494DF}">
+              <a14:hiddenLine xmlns:a14="http://schemas.microsoft.com/office/drawing/2010/main" w="9525">
+                <a:solidFill>
+                  <a:schemeClr val="tx1"/>
+                </a:solidFill>
+                <a:miter lim="800000"/>
+                <a:headEnd/>
+                <a:tailEnd/>
+              </a14:hiddenLine>
+            </a:ext>
+          </a:extLst>
+        </p:spPr>
+      </p:pic>
+      <p:pic>
+        <p:nvPicPr>
+          <p:cNvPr id="3074" name="Picture 2"/>
+          <p:cNvPicPr>
+            <a:picLocks noChangeAspect="1" noChangeArrowheads="1"/>
+          </p:cNvPicPr>
+          <p:nvPr/>
+        </p:nvPicPr>
+        <p:blipFill>
+          <a:blip r:embed="rId5">
+            <a:extLst>
+              <a:ext uri="{28A0092B-C50C-407E-A947-70E740481C1C}">
+                <a14:useLocalDpi xmlns:a14="http://schemas.microsoft.com/office/drawing/2010/main" val="0"/>
+              </a:ext>
+            </a:extLst>
+          </a:blip>
+          <a:srcRect/>
+          <a:stretch>
+            <a:fillRect/>
+          </a:stretch>
+        </p:blipFill>
+        <p:spPr bwMode="auto">
+          <a:xfrm>
+            <a:off x="0" y="457200"/>
+            <a:ext cx="9144000" cy="142875"/>
+          </a:xfrm>
+          <a:prstGeom prst="rect">
+            <a:avLst/>
+          </a:prstGeom>
+          <a:noFill/>
+          <a:ln>
+            <a:noFill/>
+          </a:ln>
+          <a:extLst>
+            <a:ext uri="{909E8E84-426E-40DD-AFC4-6F175D3DCCD1}">
+              <a14:hiddenFill xmlns:a14="http://schemas.microsoft.com/office/drawing/2010/main">
+                <a:solidFill>
+                  <a:schemeClr val="accent1"/>
+                </a:solidFill>
+              </a14:hiddenFill>
+            </a:ext>
+            <a:ext uri="{91240B29-F687-4F45-9708-019B960494DF}">
+              <a14:hiddenLine xmlns:a14="http://schemas.microsoft.com/office/drawing/2010/main" w="9525">
+                <a:solidFill>
+                  <a:schemeClr val="tx1"/>
+                </a:solidFill>
+                <a:miter lim="800000"/>
+                <a:headEnd/>
+                <a:tailEnd/>
+              </a14:hiddenLine>
+            </a:ext>
+          </a:extLst>
+        </p:spPr>
+      </p:pic>
+      <p:pic>
+        <p:nvPicPr>
+          <p:cNvPr id="3076" name="Picture 4"/>
+          <p:cNvPicPr>
+            <a:picLocks noChangeAspect="1" noChangeArrowheads="1"/>
+          </p:cNvPicPr>
+          <p:nvPr/>
+        </p:nvPicPr>
+        <p:blipFill>
+          <a:blip r:embed="rId6">
+            <a:extLst>
+              <a:ext uri="{28A0092B-C50C-407E-A947-70E740481C1C}">
+                <a14:useLocalDpi xmlns:a14="http://schemas.microsoft.com/office/drawing/2010/main" val="0"/>
+              </a:ext>
+            </a:extLst>
+          </a:blip>
+          <a:srcRect/>
+          <a:stretch>
+            <a:fillRect/>
+          </a:stretch>
+        </p:blipFill>
+        <p:spPr bwMode="auto">
+          <a:xfrm>
+            <a:off x="0" y="5585164"/>
+            <a:ext cx="9144000" cy="190500"/>
           </a:xfrm>
           <a:prstGeom prst="rect">
             <a:avLst/>
@@ -11461,6 +11597,13 @@
   <p:clrMapOvr>
     <a:masterClrMapping/>
   </p:clrMapOvr>
+  <p:timing>
+    <p:tnLst>
+      <p:par>
+        <p:cTn id="1" dur="indefinite" restart="never" nodeType="tmRoot"/>
+      </p:par>
+    </p:tnLst>
+  </p:timing>
 </p:sld>
 </file>
 
@@ -11503,7 +11646,7 @@
         <p:spPr>
           <a:xfrm>
             <a:off x="0" y="76200"/>
-            <a:ext cx="9144000" cy="5727032"/>
+            <a:ext cx="9144000" cy="5715000"/>
           </a:xfrm>
           <a:prstGeom prst="rect">
             <a:avLst/>
@@ -11520,6 +11663,13 @@
   <p:clrMapOvr>
     <a:masterClrMapping/>
   </p:clrMapOvr>
+  <p:timing>
+    <p:tnLst>
+      <p:par>
+        <p:cTn id="1" dur="indefinite" restart="never" nodeType="tmRoot"/>
+      </p:par>
+    </p:tnLst>
+  </p:timing>
 </p:sld>
 </file>
 
@@ -11654,6 +11804,13 @@
   <p:clrMapOvr>
     <a:masterClrMapping/>
   </p:clrMapOvr>
+  <p:timing>
+    <p:tnLst>
+      <p:par>
+        <p:cTn id="1" dur="indefinite" restart="never" nodeType="tmRoot"/>
+      </p:par>
+    </p:tnLst>
+  </p:timing>
 </p:sld>
 </file>
 
@@ -11695,8 +11852,8 @@
         </p:blipFill>
         <p:spPr>
           <a:xfrm>
-            <a:off x="0" y="5179"/>
-            <a:ext cx="9144000" cy="5850194"/>
+            <a:off x="0" y="76201"/>
+            <a:ext cx="9144000" cy="5714999"/>
           </a:xfrm>
           <a:prstGeom prst="rect">
             <a:avLst/>
@@ -11713,6 +11870,13 @@
   <p:clrMapOvr>
     <a:masterClrMapping/>
   </p:clrMapOvr>
+  <p:timing>
+    <p:tnLst>
+      <p:par>
+        <p:cTn id="1" dur="indefinite" restart="never" nodeType="tmRoot"/>
+      </p:par>
+    </p:tnLst>
+  </p:timing>
 </p:sld>
 </file>
 
@@ -11754,12 +11918,66 @@
         </p:blipFill>
         <p:spPr>
           <a:xfrm>
-            <a:off x="0" y="152400"/>
-            <a:ext cx="9144000" cy="5608949"/>
-          </a:xfrm>
-          <a:prstGeom prst="rect">
-            <a:avLst/>
-          </a:prstGeom>
+            <a:off x="0" y="76200"/>
+            <a:ext cx="9144000" cy="5715000"/>
+          </a:xfrm>
+          <a:prstGeom prst="rect">
+            <a:avLst/>
+          </a:prstGeom>
+        </p:spPr>
+      </p:pic>
+      <p:pic>
+        <p:nvPicPr>
+          <p:cNvPr id="2050" name="Picture 2"/>
+          <p:cNvPicPr>
+            <a:picLocks noChangeAspect="1" noChangeArrowheads="1"/>
+          </p:cNvPicPr>
+          <p:nvPr/>
+        </p:nvPicPr>
+        <p:blipFill>
+          <a:blip r:embed="rId3">
+            <a:extLst>
+              <a:ext uri="{28A0092B-C50C-407E-A947-70E740481C1C}">
+                <a14:useLocalDpi xmlns:a14="http://schemas.microsoft.com/office/drawing/2010/main" val="0"/>
+              </a:ext>
+            </a:extLst>
+          </a:blip>
+          <a:srcRect/>
+          <a:stretch>
+            <a:fillRect/>
+          </a:stretch>
+        </p:blipFill>
+        <p:spPr bwMode="auto">
+          <a:xfrm>
+            <a:off x="0" y="381000"/>
+            <a:ext cx="9144000" cy="142875"/>
+          </a:xfrm>
+          <a:prstGeom prst="rect">
+            <a:avLst/>
+          </a:prstGeom>
+          <a:noFill/>
+          <a:ln>
+            <a:noFill/>
+          </a:ln>
+          <a:extLst>
+            <a:ext uri="{909E8E84-426E-40DD-AFC4-6F175D3DCCD1}">
+              <a14:hiddenFill xmlns:a14="http://schemas.microsoft.com/office/drawing/2010/main">
+                <a:solidFill>
+                  <a:schemeClr val="accent1"/>
+                </a:solidFill>
+              </a14:hiddenFill>
+            </a:ext>
+            <a:ext uri="{91240B29-F687-4F45-9708-019B960494DF}">
+              <a14:hiddenLine xmlns:a14="http://schemas.microsoft.com/office/drawing/2010/main" w="9525">
+                <a:solidFill>
+                  <a:schemeClr val="tx1"/>
+                </a:solidFill>
+                <a:miter lim="800000"/>
+                <a:headEnd/>
+                <a:tailEnd/>
+              </a14:hiddenLine>
+            </a:ext>
+          </a:extLst>
         </p:spPr>
       </p:pic>
     </p:spTree>
@@ -11772,6 +11990,13 @@
   <p:clrMapOvr>
     <a:masterClrMapping/>
   </p:clrMapOvr>
+  <p:timing>
+    <p:tnLst>
+      <p:par>
+        <p:cTn id="1" dur="indefinite" restart="never" nodeType="tmRoot"/>
+      </p:par>
+    </p:tnLst>
+  </p:timing>
 </p:sld>
 </file>
 
@@ -11867,6 +12092,13 @@
   <p:clrMapOvr>
     <a:masterClrMapping/>
   </p:clrMapOvr>
+  <p:timing>
+    <p:tnLst>
+      <p:par>
+        <p:cTn id="1" dur="indefinite" restart="never" nodeType="tmRoot"/>
+      </p:par>
+    </p:tnLst>
+  </p:timing>
 </p:sld>
 </file>
 
@@ -11960,6 +12192,13 @@
   <p:clrMapOvr>
     <a:masterClrMapping/>
   </p:clrMapOvr>
+  <p:timing>
+    <p:tnLst>
+      <p:par>
+        <p:cTn id="1" dur="indefinite" restart="never" nodeType="tmRoot"/>
+      </p:par>
+    </p:tnLst>
+  </p:timing>
 </p:sld>
 </file>
 
@@ -12123,6 +12362,13 @@
   <p:clrMapOvr>
     <a:masterClrMapping/>
   </p:clrMapOvr>
+  <p:timing>
+    <p:tnLst>
+      <p:par>
+        <p:cTn id="1" dur="indefinite" restart="never" nodeType="tmRoot"/>
+      </p:par>
+    </p:tnLst>
+  </p:timing>
 </p:sld>
 </file>
 
@@ -12199,47 +12445,6 @@
       </p:pic>
       <p:pic>
         <p:nvPicPr>
-          <p:cNvPr id="1034" name="Picture 10" descr="C:\Users\Owner\AppData\Local\Microsoft\Windows\Temporary Internet Files\Content.IE5\4SKU0K12\White-Pixel-Mouse-Cursor-Arow-Fixed[1].png"/>
-          <p:cNvPicPr>
-            <a:picLocks noChangeAspect="1" noChangeArrowheads="1"/>
-          </p:cNvPicPr>
-          <p:nvPr/>
-        </p:nvPicPr>
-        <p:blipFill>
-          <a:blip r:embed="rId3" cstate="print">
-            <a:extLst>
-              <a:ext uri="{28A0092B-C50C-407E-A947-70E740481C1C}">
-                <a14:useLocalDpi xmlns:a14="http://schemas.microsoft.com/office/drawing/2010/main" val="0"/>
-              </a:ext>
-            </a:extLst>
-          </a:blip>
-          <a:srcRect/>
-          <a:stretch>
-            <a:fillRect/>
-          </a:stretch>
-        </p:blipFill>
-        <p:spPr bwMode="auto">
-          <a:xfrm>
-            <a:off x="1539116" y="5315449"/>
-            <a:ext cx="126873" cy="201386"/>
-          </a:xfrm>
-          <a:prstGeom prst="rect">
-            <a:avLst/>
-          </a:prstGeom>
-          <a:noFill/>
-          <a:extLst>
-            <a:ext uri="{909E8E84-426E-40DD-AFC4-6F175D3DCCD1}">
-              <a14:hiddenFill xmlns:a14="http://schemas.microsoft.com/office/drawing/2010/main">
-                <a:solidFill>
-                  <a:srgbClr val="FFFFFF"/>
-                </a:solidFill>
-              </a14:hiddenFill>
-            </a:ext>
-          </a:extLst>
-        </p:spPr>
-      </p:pic>
-      <p:pic>
-        <p:nvPicPr>
           <p:cNvPr id="2050" name="Picture 2" descr="C:\Users\Owner\Documents\GitHub\psh_sp16_cmpsc488_flaggers\botbattle\botbattle\assets\images\background.png"/>
           <p:cNvPicPr>
             <a:picLocks noChangeAspect="1" noChangeArrowheads="1"/>
@@ -12247,7 +12452,7 @@
           <p:nvPr/>
         </p:nvPicPr>
         <p:blipFill>
-          <a:blip r:embed="rId4">
+          <a:blip r:embed="rId3">
             <a:extLst>
               <a:ext uri="{28A0092B-C50C-407E-A947-70E740481C1C}">
                 <a14:useLocalDpi xmlns:a14="http://schemas.microsoft.com/office/drawing/2010/main" val="0"/>
@@ -12288,7 +12493,7 @@
           <p:nvPr/>
         </p:nvPicPr>
         <p:blipFill>
-          <a:blip r:embed="rId5" cstate="print">
+          <a:blip r:embed="rId4" cstate="print">
             <a:extLst>
               <a:ext uri="{28A0092B-C50C-407E-A947-70E740481C1C}">
                 <a14:useLocalDpi xmlns:a14="http://schemas.microsoft.com/office/drawing/2010/main" val="0"/>
@@ -12342,7 +12547,7 @@
           <p:nvPr/>
         </p:nvPicPr>
         <p:blipFill>
-          <a:blip r:embed="rId5" cstate="print">
+          <a:blip r:embed="rId4" cstate="print">
             <a:extLst>
               <a:ext uri="{28A0092B-C50C-407E-A947-70E740481C1C}">
                 <a14:useLocalDpi xmlns:a14="http://schemas.microsoft.com/office/drawing/2010/main" val="0"/>
@@ -12454,7 +12659,7 @@
           <p:nvPr/>
         </p:nvPicPr>
         <p:blipFill>
-          <a:blip r:embed="rId6" cstate="print">
+          <a:blip r:embed="rId5" cstate="print">
             <a:extLst>
               <a:ext uri="{28A0092B-C50C-407E-A947-70E740481C1C}">
                 <a14:useLocalDpi xmlns:a14="http://schemas.microsoft.com/office/drawing/2010/main" val="0"/>
@@ -12508,7 +12713,7 @@
           <p:nvPr/>
         </p:nvPicPr>
         <p:blipFill>
-          <a:blip r:embed="rId6" cstate="print">
+          <a:blip r:embed="rId5" cstate="print">
             <a:extLst>
               <a:ext uri="{28A0092B-C50C-407E-A947-70E740481C1C}">
                 <a14:useLocalDpi xmlns:a14="http://schemas.microsoft.com/office/drawing/2010/main" val="0"/>
@@ -12562,7 +12767,7 @@
           <p:nvPr/>
         </p:nvPicPr>
         <p:blipFill>
-          <a:blip r:embed="rId7" cstate="print">
+          <a:blip r:embed="rId6" cstate="print">
             <a:extLst>
               <a:ext uri="{28A0092B-C50C-407E-A947-70E740481C1C}">
                 <a14:useLocalDpi xmlns:a14="http://schemas.microsoft.com/office/drawing/2010/main" val="0"/>
@@ -12603,7 +12808,7 @@
           <p:nvPr/>
         </p:nvPicPr>
         <p:blipFill>
-          <a:blip r:embed="rId8" cstate="print">
+          <a:blip r:embed="rId7" cstate="print">
             <a:extLst>
               <a:ext uri="{28A0092B-C50C-407E-A947-70E740481C1C}">
                 <a14:useLocalDpi xmlns:a14="http://schemas.microsoft.com/office/drawing/2010/main" val="0"/>
@@ -12645,6 +12850,13 @@
   <p:clrMapOvr>
     <a:masterClrMapping/>
   </p:clrMapOvr>
+  <p:timing>
+    <p:tnLst>
+      <p:par>
+        <p:cTn id="1" dur="indefinite" restart="never" nodeType="tmRoot"/>
+      </p:par>
+    </p:tnLst>
+  </p:timing>
 </p:sld>
 </file>
 
@@ -12738,6 +12950,13 @@
   <p:clrMapOvr>
     <a:masterClrMapping/>
   </p:clrMapOvr>
+  <p:timing>
+    <p:tnLst>
+      <p:par>
+        <p:cTn id="1" dur="indefinite" restart="never" nodeType="tmRoot"/>
+      </p:par>
+    </p:tnLst>
+  </p:timing>
 </p:sld>
 </file>
 
@@ -12903,7 +13122,7 @@
         </p:nvSpPr>
         <p:spPr>
           <a:xfrm>
-            <a:off x="1815116" y="3524250"/>
+            <a:off x="1981200" y="3524250"/>
             <a:ext cx="4580318" cy="523220"/>
           </a:xfrm>
           <a:prstGeom prst="rect">
@@ -12932,7 +13151,7 @@
         </p:nvSpPr>
         <p:spPr>
           <a:xfrm>
-            <a:off x="3920744" y="5172075"/>
+            <a:off x="2971800" y="5196766"/>
             <a:ext cx="4580318" cy="523220"/>
           </a:xfrm>
           <a:prstGeom prst="rect">
@@ -12965,7 +13184,7 @@
         </p:nvSpPr>
         <p:spPr>
           <a:xfrm rot="10800000">
-            <a:off x="371474" y="3588198"/>
+            <a:off x="395056" y="3606966"/>
             <a:ext cx="4580318" cy="523220"/>
           </a:xfrm>
           <a:prstGeom prst="rect">
@@ -13013,7 +13232,7 @@
         </p:blipFill>
         <p:spPr bwMode="auto">
           <a:xfrm>
-            <a:off x="371475" y="1600200"/>
+            <a:off x="457200" y="1568388"/>
             <a:ext cx="3539744" cy="1608336"/>
           </a:xfrm>
           <a:prstGeom prst="rect">
@@ -13066,7 +13285,7 @@
         </p:blipFill>
         <p:spPr>
           <a:xfrm>
-            <a:off x="1379347" y="4253417"/>
+            <a:off x="1219200" y="4195986"/>
             <a:ext cx="1524000" cy="1524000"/>
           </a:xfrm>
           <a:prstGeom prst="rect">
@@ -13084,6 +13303,182 @@
   <p:clrMapOvr>
     <a:masterClrMapping/>
   </p:clrMapOvr>
+  <p:timing>
+    <p:tnLst>
+      <p:par>
+        <p:cTn id="1" dur="indefinite" restart="never" nodeType="tmRoot">
+          <p:childTnLst>
+            <p:seq concurrent="1" nextAc="seek">
+              <p:cTn id="2" dur="indefinite" nodeType="mainSeq">
+                <p:childTnLst>
+                  <p:par>
+                    <p:cTn id="3" fill="hold">
+                      <p:stCondLst>
+                        <p:cond delay="indefinite"/>
+                      </p:stCondLst>
+                      <p:childTnLst>
+                        <p:par>
+                          <p:cTn id="4" fill="hold">
+                            <p:stCondLst>
+                              <p:cond delay="0"/>
+                            </p:stCondLst>
+                            <p:childTnLst>
+                              <p:par>
+                                <p:cTn id="5" presetID="9" presetClass="emph" presetSubtype="0" grpId="0" nodeType="clickEffect">
+                                  <p:stCondLst>
+                                    <p:cond delay="0"/>
+                                  </p:stCondLst>
+                                  <p:childTnLst>
+                                    <p:set>
+                                      <p:cBhvr rctx="PPT">
+                                        <p:cTn id="6" dur="indefinite"/>
+                                        <p:tgtEl>
+                                          <p:spTgt spid="5"/>
+                                        </p:tgtEl>
+                                        <p:attrNameLst>
+                                          <p:attrName>style.opacity</p:attrName>
+                                        </p:attrNameLst>
+                                      </p:cBhvr>
+                                      <p:to>
+                                        <p:strVal val="0.15"/>
+                                      </p:to>
+                                    </p:set>
+                                    <p:animEffect filter="image" prLst="opacity: 0.15">
+                                      <p:cBhvr rctx="IE">
+                                        <p:cTn id="7" dur="indefinite"/>
+                                        <p:tgtEl>
+                                          <p:spTgt spid="5"/>
+                                        </p:tgtEl>
+                                      </p:cBhvr>
+                                    </p:animEffect>
+                                  </p:childTnLst>
+                                </p:cTn>
+                              </p:par>
+                              <p:par>
+                                <p:cTn id="8" presetID="9" presetClass="emph" presetSubtype="0" nodeType="withEffect">
+                                  <p:stCondLst>
+                                    <p:cond delay="0"/>
+                                  </p:stCondLst>
+                                  <p:childTnLst>
+                                    <p:set>
+                                      <p:cBhvr rctx="PPT">
+                                        <p:cTn id="9" dur="indefinite"/>
+                                        <p:tgtEl>
+                                          <p:spTgt spid="2052"/>
+                                        </p:tgtEl>
+                                        <p:attrNameLst>
+                                          <p:attrName>style.opacity</p:attrName>
+                                        </p:attrNameLst>
+                                      </p:cBhvr>
+                                      <p:to>
+                                        <p:strVal val="0.25"/>
+                                      </p:to>
+                                    </p:set>
+                                    <p:animEffect filter="image" prLst="opacity: 0.25">
+                                      <p:cBhvr rctx="IE">
+                                        <p:cTn id="10" dur="indefinite"/>
+                                        <p:tgtEl>
+                                          <p:spTgt spid="2052"/>
+                                        </p:tgtEl>
+                                      </p:cBhvr>
+                                    </p:animEffect>
+                                  </p:childTnLst>
+                                </p:cTn>
+                              </p:par>
+                              <p:par>
+                                <p:cTn id="11" presetID="9" presetClass="emph" presetSubtype="0" grpId="0" nodeType="withEffect">
+                                  <p:stCondLst>
+                                    <p:cond delay="0"/>
+                                  </p:stCondLst>
+                                  <p:childTnLst>
+                                    <p:set>
+                                      <p:cBhvr rctx="PPT">
+                                        <p:cTn id="12" dur="indefinite"/>
+                                        <p:tgtEl>
+                                          <p:spTgt spid="8"/>
+                                        </p:tgtEl>
+                                        <p:attrNameLst>
+                                          <p:attrName>style.opacity</p:attrName>
+                                        </p:attrNameLst>
+                                      </p:cBhvr>
+                                      <p:to>
+                                        <p:strVal val="0.15"/>
+                                      </p:to>
+                                    </p:set>
+                                    <p:animEffect filter="image" prLst="opacity: 0.15">
+                                      <p:cBhvr rctx="IE">
+                                        <p:cTn id="13" dur="indefinite"/>
+                                        <p:tgtEl>
+                                          <p:spTgt spid="8"/>
+                                        </p:tgtEl>
+                                      </p:cBhvr>
+                                    </p:animEffect>
+                                  </p:childTnLst>
+                                </p:cTn>
+                              </p:par>
+                              <p:par>
+                                <p:cTn id="14" presetID="9" presetClass="emph" presetSubtype="0" nodeType="withEffect">
+                                  <p:stCondLst>
+                                    <p:cond delay="0"/>
+                                  </p:stCondLst>
+                                  <p:childTnLst>
+                                    <p:set>
+                                      <p:cBhvr rctx="PPT">
+                                        <p:cTn id="15" dur="indefinite"/>
+                                        <p:tgtEl>
+                                          <p:spTgt spid="3"/>
+                                        </p:tgtEl>
+                                        <p:attrNameLst>
+                                          <p:attrName>style.opacity</p:attrName>
+                                        </p:attrNameLst>
+                                      </p:cBhvr>
+                                      <p:to>
+                                        <p:strVal val="0.25"/>
+                                      </p:to>
+                                    </p:set>
+                                    <p:animEffect filter="image" prLst="opacity: 0.25">
+                                      <p:cBhvr rctx="IE">
+                                        <p:cTn id="16" dur="indefinite"/>
+                                        <p:tgtEl>
+                                          <p:spTgt spid="3"/>
+                                        </p:tgtEl>
+                                      </p:cBhvr>
+                                    </p:animEffect>
+                                  </p:childTnLst>
+                                </p:cTn>
+                              </p:par>
+                            </p:childTnLst>
+                          </p:cTn>
+                        </p:par>
+                      </p:childTnLst>
+                    </p:cTn>
+                  </p:par>
+                </p:childTnLst>
+              </p:cTn>
+              <p:prevCondLst>
+                <p:cond evt="onPrev" delay="0">
+                  <p:tgtEl>
+                    <p:sldTgt/>
+                  </p:tgtEl>
+                </p:cond>
+              </p:prevCondLst>
+              <p:nextCondLst>
+                <p:cond evt="onNext" delay="0">
+                  <p:tgtEl>
+                    <p:sldTgt/>
+                  </p:tgtEl>
+                </p:cond>
+              </p:nextCondLst>
+            </p:seq>
+          </p:childTnLst>
+        </p:cTn>
+      </p:par>
+    </p:tnLst>
+    <p:bldLst>
+      <p:bldP spid="5" grpId="0"/>
+      <p:bldP spid="8" grpId="0"/>
+    </p:bldLst>
+  </p:timing>
 </p:sld>
 </file>
 
@@ -13112,8 +13507,8 @@
         </p:nvSpPr>
         <p:spPr>
           <a:xfrm>
-            <a:off x="2981482" y="317335"/>
-            <a:ext cx="2839240" cy="923330"/>
+            <a:off x="2000447" y="317335"/>
+            <a:ext cx="4801315" cy="923330"/>
           </a:xfrm>
           <a:prstGeom prst="rect">
             <a:avLst/>
@@ -13128,7 +13523,7 @@
           <a:p>
             <a:pPr algn="ctr"/>
             <a:r>
-              <a:rPr lang="en-US" sz="5400" b="1" dirty="0">
+              <a:rPr lang="en-US" sz="5400" b="1" dirty="0" smtClean="0">
                 <a:ln w="1905"/>
                 <a:gradFill>
                   <a:gsLst>
@@ -13162,8 +13557,42 @@
                   </a:innerShdw>
                 </a:effectLst>
               </a:rPr>
-              <a:t>Our Job</a:t>
+              <a:t>Requirements</a:t>
             </a:r>
+            <a:endParaRPr lang="en-US" sz="5400" b="1" dirty="0">
+              <a:ln w="1905"/>
+              <a:gradFill>
+                <a:gsLst>
+                  <a:gs pos="0">
+                    <a:schemeClr val="accent6">
+                      <a:shade val="20000"/>
+                      <a:satMod val="200000"/>
+                    </a:schemeClr>
+                  </a:gs>
+                  <a:gs pos="78000">
+                    <a:schemeClr val="accent6">
+                      <a:tint val="90000"/>
+                      <a:shade val="89000"/>
+                      <a:satMod val="220000"/>
+                    </a:schemeClr>
+                  </a:gs>
+                  <a:gs pos="100000">
+                    <a:schemeClr val="accent6">
+                      <a:tint val="12000"/>
+                      <a:satMod val="255000"/>
+                    </a:schemeClr>
+                  </a:gs>
+                </a:gsLst>
+                <a:lin ang="5400000"/>
+              </a:gradFill>
+              <a:effectLst>
+                <a:innerShdw blurRad="69850" dist="43180" dir="5400000">
+                  <a:srgbClr val="000000">
+                    <a:alpha val="65000"/>
+                  </a:srgbClr>
+                </a:innerShdw>
+              </a:effectLst>
+            </a:endParaRPr>
           </a:p>
         </p:txBody>
       </p:sp>
@@ -13247,6 +13676,13 @@
   <p:clrMapOvr>
     <a:masterClrMapping/>
   </p:clrMapOvr>
+  <p:timing>
+    <p:tnLst>
+      <p:par>
+        <p:cTn id="1" dur="indefinite" restart="never" nodeType="tmRoot"/>
+      </p:par>
+    </p:tnLst>
+  </p:timing>
 </p:sld>
 </file>
 
@@ -13340,6 +13776,13 @@
   <p:clrMapOvr>
     <a:masterClrMapping/>
   </p:clrMapOvr>
+  <p:timing>
+    <p:tnLst>
+      <p:par>
+        <p:cTn id="1" dur="indefinite" restart="never" nodeType="tmRoot"/>
+      </p:par>
+    </p:tnLst>
+  </p:timing>
 </p:sld>
 </file>
 
@@ -13400,6 +13843,13 @@
   <p:clrMapOvr>
     <a:masterClrMapping/>
   </p:clrMapOvr>
+  <p:timing>
+    <p:tnLst>
+      <p:par>
+        <p:cTn id="1" dur="indefinite" restart="never" nodeType="tmRoot"/>
+      </p:par>
+    </p:tnLst>
+  </p:timing>
 </p:sld>
 </file>
 
@@ -13634,6 +14084,13 @@
   <p:clrMapOvr>
     <a:masterClrMapping/>
   </p:clrMapOvr>
+  <p:timing>
+    <p:tnLst>
+      <p:par>
+        <p:cTn id="1" dur="indefinite" restart="never" nodeType="tmRoot"/>
+      </p:par>
+    </p:tnLst>
+  </p:timing>
 </p:sld>
 </file>
 
@@ -13754,9 +14211,10 @@
               <a:buChar char="•"/>
             </a:pPr>
             <a:r>
-              <a:rPr lang="en-US" sz="3600" b="1" dirty="0"/>
-              <a:t>Speed Slider</a:t>
+              <a:rPr lang="en-US" sz="3600" b="1" dirty="0" smtClean="0"/>
+              <a:t>Variable Speed</a:t>
             </a:r>
+            <a:endParaRPr lang="en-US" sz="3600" b="1" dirty="0"/>
           </a:p>
           <a:p>
             <a:pPr marL="914400" lvl="1" indent="-457200">
@@ -13797,6 +14255,13 @@
   <p:clrMapOvr>
     <a:masterClrMapping/>
   </p:clrMapOvr>
+  <p:timing>
+    <p:tnLst>
+      <p:par>
+        <p:cTn id="1" dur="indefinite" restart="never" nodeType="tmRoot"/>
+      </p:par>
+    </p:tnLst>
+  </p:timing>
 </p:sld>
 </file>
 
@@ -14906,6 +15371,13 @@
   <p:clrMapOvr>
     <a:masterClrMapping/>
   </p:clrMapOvr>
+  <p:timing>
+    <p:tnLst>
+      <p:par>
+        <p:cTn id="1" dur="indefinite" restart="never" nodeType="tmRoot"/>
+      </p:par>
+    </p:tnLst>
+  </p:timing>
 </p:sld>
 </file>
 

</xml_diff>

<commit_message>
Finished promo video, fixed one thing in documentation
</commit_message>
<xml_diff>
--- a/Presentation Materials/Capstone Presentation.pptx
+++ b/Presentation Materials/Capstone Presentation.pptx
@@ -11317,47 +11317,6 @@
       </p:grpSpPr>
       <p:pic>
         <p:nvPicPr>
-          <p:cNvPr id="4098" name="Picture 2" descr="C:\Users\Owner\Desktop\TestingArena.png"/>
-          <p:cNvPicPr>
-            <a:picLocks noChangeAspect="1" noChangeArrowheads="1"/>
-          </p:cNvPicPr>
-          <p:nvPr/>
-        </p:nvPicPr>
-        <p:blipFill>
-          <a:blip r:embed="rId2">
-            <a:extLst>
-              <a:ext uri="{28A0092B-C50C-407E-A947-70E740481C1C}">
-                <a14:useLocalDpi xmlns:a14="http://schemas.microsoft.com/office/drawing/2010/main" val="0"/>
-              </a:ext>
-            </a:extLst>
-          </a:blip>
-          <a:srcRect/>
-          <a:stretch>
-            <a:fillRect/>
-          </a:stretch>
-        </p:blipFill>
-        <p:spPr bwMode="auto">
-          <a:xfrm>
-            <a:off x="0" y="76200"/>
-            <a:ext cx="9144000" cy="5667292"/>
-          </a:xfrm>
-          <a:prstGeom prst="rect">
-            <a:avLst/>
-          </a:prstGeom>
-          <a:noFill/>
-          <a:extLst>
-            <a:ext uri="{909E8E84-426E-40DD-AFC4-6F175D3DCCD1}">
-              <a14:hiddenFill xmlns:a14="http://schemas.microsoft.com/office/drawing/2010/main">
-                <a:solidFill>
-                  <a:srgbClr val="FFFFFF"/>
-                </a:solidFill>
-              </a14:hiddenFill>
-            </a:ext>
-          </a:extLst>
-        </p:spPr>
-      </p:pic>
-      <p:pic>
-        <p:nvPicPr>
           <p:cNvPr id="6" name="Picture 10" descr="C:\Users\Owner\AppData\Local\Microsoft\Windows\Temporary Internet Files\Content.IE5\4SKU0K12\White-Pixel-Mouse-Cursor-Arow-Fixed[1].png"/>
           <p:cNvPicPr>
             <a:picLocks noChangeAspect="1" noChangeArrowheads="1"/>
@@ -11365,7 +11324,7 @@
           <p:nvPr/>
         </p:nvPicPr>
         <p:blipFill>
-          <a:blip r:embed="rId3" cstate="print">
+          <a:blip r:embed="rId2" cstate="print">
             <a:extLst>
               <a:ext uri="{28A0092B-C50C-407E-A947-70E740481C1C}">
                 <a14:useLocalDpi xmlns:a14="http://schemas.microsoft.com/office/drawing/2010/main" val="0"/>
@@ -11406,7 +11365,7 @@
           <p:nvPr/>
         </p:nvPicPr>
         <p:blipFill>
-          <a:blip r:embed="rId4">
+          <a:blip r:embed="rId3">
             <a:extLst>
               <a:ext uri="{28A0092B-C50C-407E-A947-70E740481C1C}">
                 <a14:useLocalDpi xmlns:a14="http://schemas.microsoft.com/office/drawing/2010/main" val="0"/>
@@ -11449,6 +11408,35 @@
               </a14:hiddenLine>
             </a:ext>
           </a:extLst>
+        </p:spPr>
+      </p:pic>
+      <p:pic>
+        <p:nvPicPr>
+          <p:cNvPr id="2" name="Picture 1" descr="Screen Clipping"/>
+          <p:cNvPicPr>
+            <a:picLocks noChangeAspect="1"/>
+          </p:cNvPicPr>
+          <p:nvPr/>
+        </p:nvPicPr>
+        <p:blipFill rotWithShape="1">
+          <a:blip r:embed="rId4">
+            <a:extLst>
+              <a:ext uri="{28A0092B-C50C-407E-A947-70E740481C1C}">
+                <a14:useLocalDpi xmlns:a14="http://schemas.microsoft.com/office/drawing/2010/main" val="0"/>
+              </a:ext>
+            </a:extLst>
+          </a:blip>
+          <a:srcRect l="10884" t="8602" r="10834"/>
+          <a:stretch/>
+        </p:blipFill>
+        <p:spPr>
+          <a:xfrm>
+            <a:off x="0" y="14796"/>
+            <a:ext cx="9144000" cy="5802432"/>
+          </a:xfrm>
+          <a:prstGeom prst="rect">
+            <a:avLst/>
+          </a:prstGeom>
         </p:spPr>
       </p:pic>
     </p:spTree>
@@ -11792,71 +11780,34 @@
           <a:chExt cx="0" cy="0"/>
         </a:xfrm>
       </p:grpSpPr>
-      <p:sp>
-        <p:nvSpPr>
-          <p:cNvPr id="2" name="Title 1"/>
-          <p:cNvSpPr>
-            <a:spLocks noGrp="1"/>
-          </p:cNvSpPr>
-          <p:nvPr>
-            <p:ph type="title"/>
-          </p:nvPr>
-        </p:nvSpPr>
-        <p:spPr/>
-        <p:txBody>
-          <a:bodyPr/>
-          <a:lstStyle/>
-          <a:p>
-            <a:r>
-              <a:rPr lang="en-US" dirty="0"/>
-              <a:t>Tom put TA game display picture here</a:t>
-            </a:r>
-          </a:p>
-        </p:txBody>
-      </p:sp>
-      <p:sp>
-        <p:nvSpPr>
-          <p:cNvPr id="3" name="Content Placeholder 2"/>
-          <p:cNvSpPr>
-            <a:spLocks noGrp="1"/>
-          </p:cNvSpPr>
+      <p:pic>
+        <p:nvPicPr>
+          <p:cNvPr id="6" name="Content Placeholder 5"/>
+          <p:cNvPicPr>
+            <a:picLocks noGrp="1" noChangeAspect="1"/>
+          </p:cNvPicPr>
           <p:nvPr>
             <p:ph idx="1"/>
           </p:nvPr>
-        </p:nvSpPr>
-        <p:spPr/>
-        <p:txBody>
-          <a:bodyPr/>
-          <a:lstStyle/>
-          <a:p>
-            <a:r>
-              <a:rPr lang="en-US" dirty="0"/>
-              <a:t>TODO </a:t>
-            </a:r>
-            <a:r>
-              <a:rPr lang="en-US" dirty="0" err="1"/>
-              <a:t>TODO</a:t>
-            </a:r>
-            <a:r>
-              <a:rPr lang="en-US" dirty="0"/>
-              <a:t> </a:t>
-            </a:r>
-            <a:r>
-              <a:rPr lang="en-US" dirty="0" err="1"/>
-              <a:t>TODO</a:t>
-            </a:r>
-            <a:r>
-              <a:rPr lang="en-US" dirty="0"/>
-              <a:t> </a:t>
-            </a:r>
-            <a:r>
-              <a:rPr lang="en-US" dirty="0" err="1"/>
-              <a:t>TODO</a:t>
-            </a:r>
-            <a:endParaRPr lang="en-US" dirty="0"/>
-          </a:p>
-        </p:txBody>
-      </p:sp>
+        </p:nvPicPr>
+        <p:blipFill rotWithShape="1">
+          <a:blip r:embed="rId2">
+            <a:extLst>
+              <a:ext uri="{28A0092B-C50C-407E-A947-70E740481C1C}">
+                <a14:useLocalDpi xmlns:a14="http://schemas.microsoft.com/office/drawing/2010/main" val="0"/>
+              </a:ext>
+            </a:extLst>
+          </a:blip>
+          <a:srcRect l="10185" t="8369" r="11109"/>
+          <a:stretch/>
+        </p:blipFill>
+        <p:spPr>
+          <a:xfrm>
+            <a:off x="0" y="0"/>
+            <a:ext cx="9144000" cy="5766548"/>
+          </a:xfrm>
+        </p:spPr>
+      </p:pic>
     </p:spTree>
     <p:extLst>
       <p:ext uri="{BB962C8B-B14F-4D97-AF65-F5344CB8AC3E}">

</xml_diff>